<commit_message>
presentation and script updated
</commit_message>
<xml_diff>
--- a/writing_literature_present/final_presentation.pptx
+++ b/writing_literature_present/final_presentation.pptx
@@ -214,7 +214,7 @@
           <a:p>
             <a:fld id="{92F7578D-5DD6-45D0-A00C-236E4CA75183}" type="datetimeFigureOut">
               <a:rPr lang="en-US" smtClean="0"/>
-              <a:t>4/24/2019</a:t>
+              <a:t>4/25/2019</a:t>
             </a:fld>
             <a:endParaRPr lang="en-US"/>
           </a:p>
@@ -1986,7 +1986,7 @@
           <a:p>
             <a:fld id="{B8D8D1CD-5272-4450-BCFC-C7D00825A9E1}" type="datetimeFigureOut">
               <a:rPr lang="en-US" smtClean="0"/>
-              <a:t>4/24/2019</a:t>
+              <a:t>4/25/2019</a:t>
             </a:fld>
             <a:endParaRPr lang="en-US"/>
           </a:p>
@@ -3445,7 +3445,7 @@
           <a:p>
             <a:fld id="{B8D8D1CD-5272-4450-BCFC-C7D00825A9E1}" type="datetimeFigureOut">
               <a:rPr lang="en-US" smtClean="0"/>
-              <a:t>4/24/2019</a:t>
+              <a:t>4/25/2019</a:t>
             </a:fld>
             <a:endParaRPr lang="en-US"/>
           </a:p>
@@ -4898,7 +4898,7 @@
           <a:p>
             <a:fld id="{B8D8D1CD-5272-4450-BCFC-C7D00825A9E1}" type="datetimeFigureOut">
               <a:rPr lang="en-US" smtClean="0"/>
-              <a:t>4/24/2019</a:t>
+              <a:t>4/25/2019</a:t>
             </a:fld>
             <a:endParaRPr lang="en-US"/>
           </a:p>
@@ -6353,7 +6353,7 @@
           <a:p>
             <a:fld id="{B8D8D1CD-5272-4450-BCFC-C7D00825A9E1}" type="datetimeFigureOut">
               <a:rPr lang="en-US" smtClean="0"/>
-              <a:t>4/24/2019</a:t>
+              <a:t>4/25/2019</a:t>
             </a:fld>
             <a:endParaRPr lang="en-US"/>
           </a:p>
@@ -7861,7 +7861,7 @@
           <a:p>
             <a:fld id="{B8D8D1CD-5272-4450-BCFC-C7D00825A9E1}" type="datetimeFigureOut">
               <a:rPr lang="en-US" smtClean="0"/>
-              <a:t>4/24/2019</a:t>
+              <a:t>4/25/2019</a:t>
             </a:fld>
             <a:endParaRPr lang="en-US"/>
           </a:p>
@@ -9382,7 +9382,7 @@
           <a:p>
             <a:fld id="{B8D8D1CD-5272-4450-BCFC-C7D00825A9E1}" type="datetimeFigureOut">
               <a:rPr lang="en-US" smtClean="0"/>
-              <a:t>4/24/2019</a:t>
+              <a:t>4/25/2019</a:t>
             </a:fld>
             <a:endParaRPr lang="en-US"/>
           </a:p>
@@ -11047,7 +11047,7 @@
           <a:p>
             <a:fld id="{B8D8D1CD-5272-4450-BCFC-C7D00825A9E1}" type="datetimeFigureOut">
               <a:rPr lang="en-US" smtClean="0"/>
-              <a:t>4/24/2019</a:t>
+              <a:t>4/25/2019</a:t>
             </a:fld>
             <a:endParaRPr lang="en-US"/>
           </a:p>
@@ -12445,7 +12445,7 @@
           <a:p>
             <a:fld id="{B8D8D1CD-5272-4450-BCFC-C7D00825A9E1}" type="datetimeFigureOut">
               <a:rPr lang="en-US" smtClean="0"/>
-              <a:t>4/24/2019</a:t>
+              <a:t>4/25/2019</a:t>
             </a:fld>
             <a:endParaRPr lang="en-US"/>
           </a:p>
@@ -12545,7 +12545,7 @@
           <a:p>
             <a:fld id="{B8D8D1CD-5272-4450-BCFC-C7D00825A9E1}" type="datetimeFigureOut">
               <a:rPr lang="en-US" smtClean="0"/>
-              <a:t>4/24/2019</a:t>
+              <a:t>4/25/2019</a:t>
             </a:fld>
             <a:endParaRPr lang="en-US"/>
           </a:p>
@@ -14071,7 +14071,7 @@
           <a:p>
             <a:fld id="{B8D8D1CD-5272-4450-BCFC-C7D00825A9E1}" type="datetimeFigureOut">
               <a:rPr lang="en-US" smtClean="0"/>
-              <a:t>4/24/2019</a:t>
+              <a:t>4/25/2019</a:t>
             </a:fld>
             <a:endParaRPr lang="en-US"/>
           </a:p>
@@ -15607,7 +15607,7 @@
           <a:p>
             <a:fld id="{B8D8D1CD-5272-4450-BCFC-C7D00825A9E1}" type="datetimeFigureOut">
               <a:rPr lang="en-US" smtClean="0"/>
-              <a:t>4/24/2019</a:t>
+              <a:t>4/25/2019</a:t>
             </a:fld>
             <a:endParaRPr lang="en-US"/>
           </a:p>
@@ -15830,7 +15830,7 @@
           <a:p>
             <a:fld id="{B8D8D1CD-5272-4450-BCFC-C7D00825A9E1}" type="datetimeFigureOut">
               <a:rPr lang="en-US" smtClean="0"/>
-              <a:t>4/24/2019</a:t>
+              <a:t>4/25/2019</a:t>
             </a:fld>
             <a:endParaRPr lang="en-US"/>
           </a:p>
@@ -18111,36 +18111,273 @@
           <a:p>
             <a:r>
               <a:rPr lang="en-US" sz="3200" dirty="0"/>
-              <a:t>Regression</a:t>
+              <a:t>Method:</a:t>
+            </a:r>
+            <a:br>
+              <a:rPr lang="en-US" sz="3200" dirty="0"/>
+            </a:br>
+            <a:r>
+              <a:rPr lang="en-US" sz="3200" dirty="0"/>
+              <a:t>Linear Regression</a:t>
             </a:r>
           </a:p>
         </p:txBody>
       </p:sp>
-      <p:sp>
-        <p:nvSpPr>
-          <p:cNvPr id="3" name="Content Placeholder 2">
-            <a:extLst>
-              <a:ext uri="{FF2B5EF4-FFF2-40B4-BE49-F238E27FC236}">
-                <a16:creationId xmlns:a16="http://schemas.microsoft.com/office/drawing/2014/main" id="{94438CBB-60E1-4CAD-9280-ECE03D3D0073}"/>
-              </a:ext>
-            </a:extLst>
-          </p:cNvPr>
-          <p:cNvSpPr>
-            <a:spLocks noGrp="1"/>
-          </p:cNvSpPr>
-          <p:nvPr>
-            <p:ph idx="1"/>
-          </p:nvPr>
-        </p:nvSpPr>
-        <p:spPr/>
-        <p:txBody>
-          <a:bodyPr/>
-          <a:lstStyle/>
-          <a:p>
-            <a:endParaRPr lang="en-US"/>
-          </a:p>
-        </p:txBody>
-      </p:sp>
+      <mc:AlternateContent xmlns:mc="http://schemas.openxmlformats.org/markup-compatibility/2006">
+        <mc:Choice xmlns:a14="http://schemas.microsoft.com/office/drawing/2010/main" Requires="a14">
+          <p:sp>
+            <p:nvSpPr>
+              <p:cNvPr id="3" name="Content Placeholder 2">
+                <a:extLst>
+                  <a:ext uri="{FF2B5EF4-FFF2-40B4-BE49-F238E27FC236}">
+                    <a16:creationId xmlns:a16="http://schemas.microsoft.com/office/drawing/2014/main" id="{94438CBB-60E1-4CAD-9280-ECE03D3D0073}"/>
+                  </a:ext>
+                </a:extLst>
+              </p:cNvPr>
+              <p:cNvSpPr>
+                <a:spLocks noGrp="1"/>
+              </p:cNvSpPr>
+              <p:nvPr>
+                <p:ph idx="1"/>
+              </p:nvPr>
+            </p:nvSpPr>
+            <p:spPr/>
+            <p:txBody>
+              <a:bodyPr>
+                <a:normAutofit/>
+              </a:bodyPr>
+              <a:lstStyle/>
+              <a:p>
+                <a:pPr marL="0" indent="0">
+                  <a:buNone/>
+                </a:pPr>
+                <a:r>
+                  <a:rPr lang="en-US" sz="2800" b="0" i="1" dirty="0">
+                    <a:latin typeface="Cambria Math" panose="02040503050406030204" pitchFamily="18" charset="0"/>
+                  </a:rPr>
+                  <a:t> </a:t>
+                </a:r>
+              </a:p>
+              <a:p>
+                <a:pPr marL="0" indent="0">
+                  <a:buNone/>
+                </a:pPr>
+                <a14:m>
+                  <m:oMath xmlns:m="http://schemas.openxmlformats.org/officeDocument/2006/math">
+                    <m:r>
+                      <a:rPr lang="en-US" sz="2800" b="0" i="1" smtClean="0">
+                        <a:latin typeface="Cambria Math" panose="02040503050406030204" pitchFamily="18" charset="0"/>
+                      </a:rPr>
+                      <m:t>𝑌</m:t>
+                    </m:r>
+                    <m:r>
+                      <a:rPr lang="en-US" sz="2800" b="0" i="1" smtClean="0">
+                        <a:latin typeface="Cambria Math" panose="02040503050406030204" pitchFamily="18" charset="0"/>
+                      </a:rPr>
+                      <m:t>=</m:t>
+                    </m:r>
+                    <m:r>
+                      <a:rPr lang="en-US" sz="2800" b="0" i="1" smtClean="0">
+                        <a:latin typeface="Cambria Math" panose="02040503050406030204" pitchFamily="18" charset="0"/>
+                        <a:ea typeface="Cambria Math" panose="02040503050406030204" pitchFamily="18" charset="0"/>
+                      </a:rPr>
+                      <m:t>𝛽</m:t>
+                    </m:r>
+                    <m:r>
+                      <a:rPr lang="en-US" sz="2800" b="0" i="1" smtClean="0">
+                        <a:latin typeface="Cambria Math" panose="02040503050406030204" pitchFamily="18" charset="0"/>
+                        <a:ea typeface="Cambria Math" panose="02040503050406030204" pitchFamily="18" charset="0"/>
+                      </a:rPr>
+                      <m:t>+</m:t>
+                    </m:r>
+                    <m:sSub>
+                      <m:sSubPr>
+                        <m:ctrlPr>
+                          <a:rPr lang="en-US" sz="2800" b="0" i="1" smtClean="0">
+                            <a:latin typeface="Cambria Math" panose="02040503050406030204" pitchFamily="18" charset="0"/>
+                            <a:ea typeface="Cambria Math" panose="02040503050406030204" pitchFamily="18" charset="0"/>
+                          </a:rPr>
+                        </m:ctrlPr>
+                      </m:sSubPr>
+                      <m:e>
+                        <m:r>
+                          <a:rPr lang="en-US" sz="2800" b="0" i="1" smtClean="0">
+                            <a:latin typeface="Cambria Math" panose="02040503050406030204" pitchFamily="18" charset="0"/>
+                            <a:ea typeface="Cambria Math" panose="02040503050406030204" pitchFamily="18" charset="0"/>
+                          </a:rPr>
+                          <m:t>𝛽</m:t>
+                        </m:r>
+                      </m:e>
+                      <m:sub>
+                        <m:r>
+                          <a:rPr lang="en-US" sz="2800" b="0" i="1" smtClean="0">
+                            <a:latin typeface="Cambria Math" panose="02040503050406030204" pitchFamily="18" charset="0"/>
+                            <a:ea typeface="Cambria Math" panose="02040503050406030204" pitchFamily="18" charset="0"/>
+                          </a:rPr>
+                          <m:t>1</m:t>
+                        </m:r>
+                      </m:sub>
+                    </m:sSub>
+                    <m:sSub>
+                      <m:sSubPr>
+                        <m:ctrlPr>
+                          <a:rPr lang="en-US" sz="2800" i="1">
+                            <a:latin typeface="Cambria Math" panose="02040503050406030204" pitchFamily="18" charset="0"/>
+                            <a:ea typeface="Cambria Math" panose="02040503050406030204" pitchFamily="18" charset="0"/>
+                          </a:rPr>
+                        </m:ctrlPr>
+                      </m:sSubPr>
+                      <m:e>
+                        <m:r>
+                          <a:rPr lang="en-US" sz="2800" b="0" i="1" smtClean="0">
+                            <a:latin typeface="Cambria Math" panose="02040503050406030204" pitchFamily="18" charset="0"/>
+                            <a:ea typeface="Cambria Math" panose="02040503050406030204" pitchFamily="18" charset="0"/>
+                          </a:rPr>
+                          <m:t>𝑋</m:t>
+                        </m:r>
+                      </m:e>
+                      <m:sub>
+                        <m:r>
+                          <a:rPr lang="en-US" sz="2800" i="1">
+                            <a:latin typeface="Cambria Math" panose="02040503050406030204" pitchFamily="18" charset="0"/>
+                            <a:ea typeface="Cambria Math" panose="02040503050406030204" pitchFamily="18" charset="0"/>
+                          </a:rPr>
+                          <m:t>1</m:t>
+                        </m:r>
+                      </m:sub>
+                    </m:sSub>
+                    <m:r>
+                      <a:rPr lang="en-US" sz="2800" b="0" i="1" smtClean="0">
+                        <a:latin typeface="Cambria Math" panose="02040503050406030204" pitchFamily="18" charset="0"/>
+                        <a:ea typeface="Cambria Math" panose="02040503050406030204" pitchFamily="18" charset="0"/>
+                      </a:rPr>
+                      <m:t>+…+</m:t>
+                    </m:r>
+                    <m:sSub>
+                      <m:sSubPr>
+                        <m:ctrlPr>
+                          <a:rPr lang="en-US" sz="2800" i="1">
+                            <a:latin typeface="Cambria Math" panose="02040503050406030204" pitchFamily="18" charset="0"/>
+                            <a:ea typeface="Cambria Math" panose="02040503050406030204" pitchFamily="18" charset="0"/>
+                          </a:rPr>
+                        </m:ctrlPr>
+                      </m:sSubPr>
+                      <m:e>
+                        <m:r>
+                          <a:rPr lang="en-US" sz="2800" i="1">
+                            <a:latin typeface="Cambria Math" panose="02040503050406030204" pitchFamily="18" charset="0"/>
+                            <a:ea typeface="Cambria Math" panose="02040503050406030204" pitchFamily="18" charset="0"/>
+                          </a:rPr>
+                          <m:t>𝛽</m:t>
+                        </m:r>
+                      </m:e>
+                      <m:sub>
+                        <m:r>
+                          <a:rPr lang="en-US" sz="2800" b="0" i="1" smtClean="0">
+                            <a:latin typeface="Cambria Math" panose="02040503050406030204" pitchFamily="18" charset="0"/>
+                            <a:ea typeface="Cambria Math" panose="02040503050406030204" pitchFamily="18" charset="0"/>
+                          </a:rPr>
+                          <m:t>𝑝</m:t>
+                        </m:r>
+                      </m:sub>
+                    </m:sSub>
+                  </m:oMath>
+                </a14:m>
+                <a:r>
+                  <a:rPr lang="en-US" sz="2800" dirty="0">
+                    <a:ea typeface="Cambria Math" panose="02040503050406030204" pitchFamily="18" charset="0"/>
+                  </a:rPr>
+                  <a:t> </a:t>
+                </a:r>
+                <a14:m>
+                  <m:oMath xmlns:m="http://schemas.openxmlformats.org/officeDocument/2006/math">
+                    <m:sSub>
+                      <m:sSubPr>
+                        <m:ctrlPr>
+                          <a:rPr lang="en-US" sz="2800" i="1">
+                            <a:latin typeface="Cambria Math" panose="02040503050406030204" pitchFamily="18" charset="0"/>
+                            <a:ea typeface="Cambria Math" panose="02040503050406030204" pitchFamily="18" charset="0"/>
+                          </a:rPr>
+                        </m:ctrlPr>
+                      </m:sSubPr>
+                      <m:e>
+                        <m:r>
+                          <a:rPr lang="en-US" sz="2800" b="0" i="1" smtClean="0">
+                            <a:latin typeface="Cambria Math" panose="02040503050406030204" pitchFamily="18" charset="0"/>
+                            <a:ea typeface="Cambria Math" panose="02040503050406030204" pitchFamily="18" charset="0"/>
+                          </a:rPr>
+                          <m:t>𝑋</m:t>
+                        </m:r>
+                      </m:e>
+                      <m:sub>
+                        <m:r>
+                          <a:rPr lang="en-US" sz="2800" i="1">
+                            <a:latin typeface="Cambria Math" panose="02040503050406030204" pitchFamily="18" charset="0"/>
+                            <a:ea typeface="Cambria Math" panose="02040503050406030204" pitchFamily="18" charset="0"/>
+                          </a:rPr>
+                          <m:t>𝑝</m:t>
+                        </m:r>
+                      </m:sub>
+                    </m:sSub>
+                  </m:oMath>
+                </a14:m>
+                <a:endParaRPr lang="en-US" sz="2800" dirty="0"/>
+              </a:p>
+              <a:p>
+                <a:pPr marL="0" indent="0">
+                  <a:buNone/>
+                </a:pPr>
+                <a:r>
+                  <a:rPr lang="en-US" sz="2800" dirty="0">
+                    <a:latin typeface="Calibri" panose="020F0502020204030204" pitchFamily="34" charset="0"/>
+                    <a:cs typeface="Calibri" panose="020F0502020204030204" pitchFamily="34" charset="0"/>
+                  </a:rPr>
+                  <a:t>Where Y=% of income spent on energy (i.e. energy burden)</a:t>
+                </a:r>
+              </a:p>
+            </p:txBody>
+          </p:sp>
+        </mc:Choice>
+        <mc:Fallback>
+          <p:sp>
+            <p:nvSpPr>
+              <p:cNvPr id="3" name="Content Placeholder 2">
+                <a:extLst>
+                  <a:ext uri="{FF2B5EF4-FFF2-40B4-BE49-F238E27FC236}">
+                    <a16:creationId xmlns:a16="http://schemas.microsoft.com/office/drawing/2014/main" id="{94438CBB-60E1-4CAD-9280-ECE03D3D0073}"/>
+                  </a:ext>
+                </a:extLst>
+              </p:cNvPr>
+              <p:cNvSpPr>
+                <a:spLocks noGrp="1" noRot="1" noChangeAspect="1" noMove="1" noResize="1" noEditPoints="1" noAdjustHandles="1" noChangeArrowheads="1" noChangeShapeType="1" noTextEdit="1"/>
+              </p:cNvSpPr>
+              <p:nvPr>
+                <p:ph idx="1"/>
+              </p:nvPr>
+            </p:nvSpPr>
+            <p:spPr>
+              <a:blipFill>
+                <a:blip r:embed="rId2"/>
+                <a:stretch>
+                  <a:fillRect l="-2039"/>
+                </a:stretch>
+              </a:blipFill>
+            </p:spPr>
+            <p:txBody>
+              <a:bodyPr/>
+              <a:lstStyle/>
+              <a:p>
+                <a:r>
+                  <a:rPr lang="en-US">
+                    <a:noFill/>
+                  </a:rPr>
+                  <a:t> </a:t>
+                </a:r>
+              </a:p>
+            </p:txBody>
+          </p:sp>
+        </mc:Fallback>
+      </mc:AlternateContent>
     </p:spTree>
     <p:extLst>
       <p:ext uri="{BB962C8B-B14F-4D97-AF65-F5344CB8AC3E}">
@@ -18395,13 +18632,13 @@
               </a:ext>
             </a:extLst>
           </a:blip>
-          <a:srcRect l="8744" t="17426" r="8464" b="6334"/>
+          <a:srcRect l="8744" t="20342" r="8464" b="6334"/>
           <a:stretch/>
         </p:blipFill>
         <p:spPr>
           <a:xfrm>
-            <a:off x="5512479" y="571176"/>
-            <a:ext cx="5046445" cy="6013939"/>
+            <a:off x="362964" y="102180"/>
+            <a:ext cx="5733036" cy="6570841"/>
           </a:xfrm>
           <a:ln>
             <a:solidFill>
@@ -18410,6 +18647,86 @@
           </a:ln>
         </p:spPr>
       </p:pic>
+      <p:pic>
+        <p:nvPicPr>
+          <p:cNvPr id="4" name="Picture 3">
+            <a:extLst>
+              <a:ext uri="{FF2B5EF4-FFF2-40B4-BE49-F238E27FC236}">
+                <a16:creationId xmlns:a16="http://schemas.microsoft.com/office/drawing/2014/main" id="{D7110506-3DA2-438C-A1BF-A5C3E17DBEE2}"/>
+              </a:ext>
+            </a:extLst>
+          </p:cNvPr>
+          <p:cNvPicPr>
+            <a:picLocks noChangeAspect="1"/>
+          </p:cNvPicPr>
+          <p:nvPr/>
+        </p:nvPicPr>
+        <p:blipFill>
+          <a:blip r:embed="rId3">
+            <a:extLst>
+              <a:ext uri="{28A0092B-C50C-407E-A947-70E740481C1C}">
+                <a14:useLocalDpi xmlns:a14="http://schemas.microsoft.com/office/drawing/2010/main" val="0"/>
+              </a:ext>
+            </a:extLst>
+          </a:blip>
+          <a:stretch>
+            <a:fillRect/>
+          </a:stretch>
+        </p:blipFill>
+        <p:spPr>
+          <a:xfrm>
+            <a:off x="6149937" y="1615369"/>
+            <a:ext cx="5647662" cy="3925553"/>
+          </a:xfrm>
+          <a:prstGeom prst="rect">
+            <a:avLst/>
+          </a:prstGeom>
+          <a:ln w="19050">
+            <a:solidFill>
+              <a:schemeClr val="tx1"/>
+            </a:solidFill>
+          </a:ln>
+        </p:spPr>
+      </p:pic>
+      <p:cxnSp>
+        <p:nvCxnSpPr>
+          <p:cNvPr id="7" name="Straight Connector 6">
+            <a:extLst>
+              <a:ext uri="{FF2B5EF4-FFF2-40B4-BE49-F238E27FC236}">
+                <a16:creationId xmlns:a16="http://schemas.microsoft.com/office/drawing/2014/main" id="{09104039-CD0A-41FC-B4F9-AD39007BD082}"/>
+              </a:ext>
+            </a:extLst>
+          </p:cNvPr>
+          <p:cNvCxnSpPr>
+            <a:cxnSpLocks/>
+          </p:cNvCxnSpPr>
+          <p:nvPr/>
+        </p:nvCxnSpPr>
+        <p:spPr>
+          <a:xfrm>
+            <a:off x="8534400" y="1886703"/>
+            <a:ext cx="0" cy="3182602"/>
+          </a:xfrm>
+          <a:prstGeom prst="line">
+            <a:avLst/>
+          </a:prstGeom>
+          <a:ln w="38100"/>
+        </p:spPr>
+        <p:style>
+          <a:lnRef idx="1">
+            <a:schemeClr val="accent1"/>
+          </a:lnRef>
+          <a:fillRef idx="0">
+            <a:schemeClr val="accent1"/>
+          </a:fillRef>
+          <a:effectRef idx="0">
+            <a:schemeClr val="accent1"/>
+          </a:effectRef>
+          <a:fontRef idx="minor">
+            <a:schemeClr val="tx1"/>
+          </a:fontRef>
+        </p:style>
+      </p:cxnSp>
     </p:spTree>
     <p:extLst>
       <p:ext uri="{BB962C8B-B14F-4D97-AF65-F5344CB8AC3E}">
@@ -23206,6 +23523,7 @@
                 <a:solidFill>
                   <a:schemeClr val="bg1"/>
                 </a:solidFill>
+                <a:latin typeface="+mj-lt"/>
               </a:rPr>
               <a:t>Causes of energy poverty beginning to be studied</a:t>
             </a:r>
@@ -23216,6 +23534,7 @@
                 <a:solidFill>
                   <a:schemeClr val="bg1"/>
                 </a:solidFill>
+                <a:latin typeface="+mj-lt"/>
               </a:rPr>
               <a:t>Still no geographic component</a:t>
             </a:r>
@@ -23226,6 +23545,7 @@
                 <a:solidFill>
                   <a:schemeClr val="bg1"/>
                 </a:solidFill>
+                <a:latin typeface="+mj-lt"/>
               </a:rPr>
               <a:t>Eventhough</a:t>
             </a:r>
@@ -23234,6 +23554,7 @@
                 <a:solidFill>
                   <a:schemeClr val="bg1"/>
                 </a:solidFill>
+                <a:latin typeface="+mj-lt"/>
               </a:rPr>
               <a:t> speculated in studies</a:t>
             </a:r>
@@ -26804,7 +27125,7 @@
         </p:blipFill>
         <p:spPr bwMode="auto">
           <a:xfrm>
-            <a:off x="6414257" y="1026171"/>
+            <a:off x="5931601" y="424775"/>
             <a:ext cx="2566432" cy="1536060"/>
           </a:xfrm>
           <a:prstGeom prst="rect">
@@ -26852,8 +27173,8 @@
         </p:blipFill>
         <p:spPr bwMode="auto">
           <a:xfrm>
-            <a:off x="9299162" y="1370910"/>
-            <a:ext cx="2571538" cy="849522"/>
+            <a:off x="8719503" y="917821"/>
+            <a:ext cx="3024359" cy="999114"/>
           </a:xfrm>
           <a:prstGeom prst="rect">
             <a:avLst/>
@@ -26999,77 +27320,6 @@
           </a:p>
         </p:txBody>
       </p:sp>
-      <p:sp>
-        <p:nvSpPr>
-          <p:cNvPr id="2" name="Title 1">
-            <a:extLst>
-              <a:ext uri="{FF2B5EF4-FFF2-40B4-BE49-F238E27FC236}">
-                <a16:creationId xmlns:a16="http://schemas.microsoft.com/office/drawing/2014/main" id="{3CB9A196-05E3-426E-9F99-0D87CB04EFC8}"/>
-              </a:ext>
-            </a:extLst>
-          </p:cNvPr>
-          <p:cNvSpPr>
-            <a:spLocks noGrp="1"/>
-          </p:cNvSpPr>
-          <p:nvPr>
-            <p:ph type="title"/>
-          </p:nvPr>
-        </p:nvSpPr>
-        <p:spPr>
-          <a:xfrm>
-            <a:off x="873978" y="1718735"/>
-            <a:ext cx="4318879" cy="1072378"/>
-          </a:xfrm>
-        </p:spPr>
-        <p:txBody>
-          <a:bodyPr anchor="ctr">
-            <a:normAutofit/>
-          </a:bodyPr>
-          <a:lstStyle/>
-          <a:p>
-            <a:r>
-              <a:rPr lang="en-US" sz="2300"/>
-              <a:t>4 Data sources used to create 2 data sets: analysis and validation</a:t>
-            </a:r>
-          </a:p>
-        </p:txBody>
-      </p:sp>
-      <p:sp>
-        <p:nvSpPr>
-          <p:cNvPr id="3" name="Content Placeholder 2">
-            <a:extLst>
-              <a:ext uri="{FF2B5EF4-FFF2-40B4-BE49-F238E27FC236}">
-                <a16:creationId xmlns:a16="http://schemas.microsoft.com/office/drawing/2014/main" id="{DC827852-5CCA-4F80-885A-45A26DA182DF}"/>
-              </a:ext>
-            </a:extLst>
-          </p:cNvPr>
-          <p:cNvSpPr>
-            <a:spLocks noGrp="1"/>
-          </p:cNvSpPr>
-          <p:nvPr>
-            <p:ph idx="1"/>
-          </p:nvPr>
-        </p:nvSpPr>
-        <p:spPr>
-          <a:xfrm>
-            <a:off x="873102" y="2789239"/>
-            <a:ext cx="4319535" cy="2683606"/>
-          </a:xfrm>
-        </p:spPr>
-        <p:txBody>
-          <a:bodyPr>
-            <a:normAutofit/>
-          </a:bodyPr>
-          <a:lstStyle/>
-          <a:p>
-            <a:endParaRPr lang="en-US" sz="1600" dirty="0">
-              <a:solidFill>
-                <a:srgbClr val="FFFFFE"/>
-              </a:solidFill>
-            </a:endParaRPr>
-          </a:p>
-        </p:txBody>
-      </p:sp>
       <p:pic>
         <p:nvPicPr>
           <p:cNvPr id="1028" name="Picture 4" descr="Image result for us census bureau">
@@ -27097,8 +27347,8 @@
         </p:blipFill>
         <p:spPr bwMode="auto">
           <a:xfrm>
-            <a:off x="6414136" y="4482977"/>
-            <a:ext cx="2565464" cy="1165798"/>
+            <a:off x="5981953" y="4474832"/>
+            <a:ext cx="2940505" cy="1336224"/>
           </a:xfrm>
           <a:prstGeom prst="rect">
             <a:avLst/>
@@ -27146,8 +27396,8 @@
         </p:blipFill>
         <p:spPr bwMode="auto">
           <a:xfrm>
-            <a:off x="9296195" y="4689609"/>
-            <a:ext cx="2575766" cy="749201"/>
+            <a:off x="8922458" y="4819154"/>
+            <a:ext cx="3238719" cy="942031"/>
           </a:xfrm>
           <a:prstGeom prst="rect">
             <a:avLst/>
@@ -27156,6 +27406,175 @@
           <a:ln w="9525">
             <a:noFill/>
           </a:ln>
+          <a:extLst>
+            <a:ext uri="{909E8E84-426E-40DD-AFC4-6F175D3DCCD1}">
+              <a14:hiddenFill xmlns:a14="http://schemas.microsoft.com/office/drawing/2010/main">
+                <a:solidFill>
+                  <a:srgbClr val="FFFFFF"/>
+                </a:solidFill>
+              </a14:hiddenFill>
+            </a:ext>
+          </a:extLst>
+        </p:spPr>
+      </p:pic>
+      <p:sp>
+        <p:nvSpPr>
+          <p:cNvPr id="4" name="TextBox 3">
+            <a:extLst>
+              <a:ext uri="{FF2B5EF4-FFF2-40B4-BE49-F238E27FC236}">
+                <a16:creationId xmlns:a16="http://schemas.microsoft.com/office/drawing/2014/main" id="{2D630404-2755-4633-9675-092C88683459}"/>
+              </a:ext>
+            </a:extLst>
+          </p:cNvPr>
+          <p:cNvSpPr txBox="1"/>
+          <p:nvPr/>
+        </p:nvSpPr>
+        <p:spPr>
+          <a:xfrm>
+            <a:off x="900113" y="1634393"/>
+            <a:ext cx="4265001" cy="3416320"/>
+          </a:xfrm>
+          <a:prstGeom prst="rect">
+            <a:avLst/>
+          </a:prstGeom>
+          <a:noFill/>
+        </p:spPr>
+        <p:txBody>
+          <a:bodyPr wrap="square" rtlCol="0">
+            <a:spAutoFit/>
+          </a:bodyPr>
+          <a:lstStyle/>
+          <a:p>
+            <a:pPr marL="285750" indent="-285750">
+              <a:buFont typeface="Arial" panose="020B0604020202020204" pitchFamily="34" charset="0"/>
+              <a:buChar char="•"/>
+            </a:pPr>
+            <a:r>
+              <a:rPr lang="en-US" sz="2400" dirty="0">
+                <a:solidFill>
+                  <a:schemeClr val="bg1"/>
+                </a:solidFill>
+                <a:latin typeface="Calibri" panose="020F0502020204030204" pitchFamily="34" charset="0"/>
+                <a:cs typeface="Calibri" panose="020F0502020204030204" pitchFamily="34" charset="0"/>
+              </a:rPr>
+              <a:t>5 data sources used to create 2 datasets</a:t>
+            </a:r>
+          </a:p>
+          <a:p>
+            <a:pPr marL="742950" lvl="1" indent="-285750">
+              <a:buFont typeface="Arial" panose="020B0604020202020204" pitchFamily="34" charset="0"/>
+              <a:buChar char="•"/>
+            </a:pPr>
+            <a:r>
+              <a:rPr lang="en-US" sz="2400" dirty="0">
+                <a:solidFill>
+                  <a:schemeClr val="bg1"/>
+                </a:solidFill>
+                <a:latin typeface="Calibri" panose="020F0502020204030204" pitchFamily="34" charset="0"/>
+                <a:cs typeface="Calibri" panose="020F0502020204030204" pitchFamily="34" charset="0"/>
+              </a:rPr>
+              <a:t>1) Analysis </a:t>
+            </a:r>
+          </a:p>
+          <a:p>
+            <a:pPr marL="742950" lvl="1" indent="-285750">
+              <a:buFont typeface="Arial" panose="020B0604020202020204" pitchFamily="34" charset="0"/>
+              <a:buChar char="•"/>
+            </a:pPr>
+            <a:r>
+              <a:rPr lang="en-US" sz="2400" dirty="0">
+                <a:solidFill>
+                  <a:schemeClr val="bg1"/>
+                </a:solidFill>
+                <a:latin typeface="Calibri" panose="020F0502020204030204" pitchFamily="34" charset="0"/>
+                <a:cs typeface="Calibri" panose="020F0502020204030204" pitchFamily="34" charset="0"/>
+              </a:rPr>
+              <a:t>2) Validation</a:t>
+            </a:r>
+          </a:p>
+          <a:p>
+            <a:pPr marL="285750" indent="-285750">
+              <a:buFont typeface="Arial" panose="020B0604020202020204" pitchFamily="34" charset="0"/>
+              <a:buChar char="•"/>
+            </a:pPr>
+            <a:r>
+              <a:rPr lang="en-US" sz="2400" dirty="0">
+                <a:solidFill>
+                  <a:schemeClr val="bg1"/>
+                </a:solidFill>
+                <a:latin typeface="Calibri" panose="020F0502020204030204" pitchFamily="34" charset="0"/>
+                <a:cs typeface="Calibri" panose="020F0502020204030204" pitchFamily="34" charset="0"/>
+              </a:rPr>
+              <a:t>Unique key: County</a:t>
+            </a:r>
+          </a:p>
+          <a:p>
+            <a:pPr marL="285750" indent="-285750">
+              <a:buFont typeface="Arial" panose="020B0604020202020204" pitchFamily="34" charset="0"/>
+              <a:buChar char="•"/>
+            </a:pPr>
+            <a:r>
+              <a:rPr lang="en-US" sz="2400" dirty="0">
+                <a:solidFill>
+                  <a:schemeClr val="bg1"/>
+                </a:solidFill>
+                <a:latin typeface="Calibri" panose="020F0502020204030204" pitchFamily="34" charset="0"/>
+                <a:cs typeface="Calibri" panose="020F0502020204030204" pitchFamily="34" charset="0"/>
+              </a:rPr>
+              <a:t> Unique county Federal Information Processing ID ( FIP) in each data source</a:t>
+            </a:r>
+          </a:p>
+          <a:p>
+            <a:pPr marL="285750" indent="-285750">
+              <a:buFont typeface="Arial" panose="020B0604020202020204" pitchFamily="34" charset="0"/>
+              <a:buChar char="•"/>
+            </a:pPr>
+            <a:endParaRPr lang="en-US" sz="2400" dirty="0">
+              <a:solidFill>
+                <a:schemeClr val="bg1"/>
+              </a:solidFill>
+              <a:latin typeface="Calibri" panose="020F0502020204030204" pitchFamily="34" charset="0"/>
+              <a:cs typeface="Calibri" panose="020F0502020204030204" pitchFamily="34" charset="0"/>
+            </a:endParaRPr>
+          </a:p>
+        </p:txBody>
+      </p:sp>
+      <p:pic>
+        <p:nvPicPr>
+          <p:cNvPr id="7" name="Picture 2" descr="Related image">
+            <a:extLst>
+              <a:ext uri="{FF2B5EF4-FFF2-40B4-BE49-F238E27FC236}">
+                <a16:creationId xmlns:a16="http://schemas.microsoft.com/office/drawing/2014/main" id="{88AD87DA-ABC1-494C-BA17-ED503734A354}"/>
+              </a:ext>
+            </a:extLst>
+          </p:cNvPr>
+          <p:cNvPicPr>
+            <a:picLocks noChangeAspect="1" noChangeArrowheads="1"/>
+          </p:cNvPicPr>
+          <p:nvPr/>
+        </p:nvPicPr>
+        <p:blipFill>
+          <a:blip r:embed="rId7">
+            <a:extLst>
+              <a:ext uri="{28A0092B-C50C-407E-A947-70E740481C1C}">
+                <a14:useLocalDpi xmlns:a14="http://schemas.microsoft.com/office/drawing/2010/main" val="0"/>
+              </a:ext>
+            </a:extLst>
+          </a:blip>
+          <a:srcRect/>
+          <a:stretch>
+            <a:fillRect/>
+          </a:stretch>
+        </p:blipFill>
+        <p:spPr bwMode="auto">
+          <a:xfrm>
+            <a:off x="8119634" y="2066592"/>
+            <a:ext cx="2874786" cy="2074587"/>
+          </a:xfrm>
+          <a:prstGeom prst="rect">
+            <a:avLst/>
+          </a:prstGeom>
+          <a:noFill/>
           <a:extLst>
             <a:ext uri="{909E8E84-426E-40DD-AFC4-6F175D3DCCD1}">
               <a14:hiddenFill xmlns:a14="http://schemas.microsoft.com/office/drawing/2010/main">
@@ -29250,45 +29669,6 @@
           </p:txBody>
         </p:sp>
       </p:grpSp>
-      <p:sp>
-        <p:nvSpPr>
-          <p:cNvPr id="2" name="Title 1">
-            <a:extLst>
-              <a:ext uri="{FF2B5EF4-FFF2-40B4-BE49-F238E27FC236}">
-                <a16:creationId xmlns:a16="http://schemas.microsoft.com/office/drawing/2014/main" id="{A6F4A470-30AE-4470-96F8-668E6BEF688A}"/>
-              </a:ext>
-            </a:extLst>
-          </p:cNvPr>
-          <p:cNvSpPr>
-            <a:spLocks noGrp="1"/>
-          </p:cNvSpPr>
-          <p:nvPr>
-            <p:ph type="title"/>
-          </p:nvPr>
-        </p:nvSpPr>
-        <p:spPr>
-          <a:xfrm>
-            <a:off x="1407198" y="238381"/>
-            <a:ext cx="8673427" cy="1048945"/>
-          </a:xfrm>
-        </p:spPr>
-        <p:txBody>
-          <a:bodyPr>
-            <a:normAutofit/>
-          </a:bodyPr>
-          <a:lstStyle/>
-          <a:p>
-            <a:r>
-              <a:rPr lang="en-US" sz="3200" dirty="0">
-                <a:solidFill>
-                  <a:schemeClr val="tx1"/>
-                </a:solidFill>
-              </a:rPr>
-              <a:t>Variables </a:t>
-            </a:r>
-          </a:p>
-        </p:txBody>
-      </p:sp>
       <p:graphicFrame>
         <p:nvGraphicFramePr>
           <p:cNvPr id="4" name="Content Placeholder 3">
@@ -29305,14 +29685,14 @@
             <p:ph idx="1"/>
             <p:extLst>
               <p:ext uri="{D42A27DB-BD31-4B8C-83A1-F6EECF244321}">
-                <p14:modId xmlns:p14="http://schemas.microsoft.com/office/powerpoint/2010/main" val="2342583827"/>
+                <p14:modId xmlns:p14="http://schemas.microsoft.com/office/powerpoint/2010/main" val="2455396141"/>
               </p:ext>
             </p:extLst>
           </p:nvPr>
         </p:nvGraphicFramePr>
         <p:xfrm>
-          <a:off x="3520800" y="376238"/>
-          <a:ext cx="5093625" cy="6344173"/>
+          <a:off x="4889178" y="107499"/>
+          <a:ext cx="5977261" cy="6552935"/>
         </p:xfrm>
         <a:graphic>
           <a:graphicData uri="http://schemas.openxmlformats.org/drawingml/2006/table">
@@ -29321,22 +29701,29 @@
                 <a:tableStyleId>{5C22544A-7EE6-4342-B048-85BDC9FD1C3A}</a:tableStyleId>
               </a:tblPr>
               <a:tblGrid>
-                <a:gridCol w="2325523">
+                <a:gridCol w="2209016">
                   <a:extLst>
                     <a:ext uri="{9D8B030D-6E8A-4147-A177-3AD203B41FA5}">
                       <a16:colId xmlns:a16="http://schemas.microsoft.com/office/drawing/2014/main" val="3411579560"/>
                     </a:ext>
                   </a:extLst>
                 </a:gridCol>
-                <a:gridCol w="2768102">
+                <a:gridCol w="1603551">
                   <a:extLst>
                     <a:ext uri="{9D8B030D-6E8A-4147-A177-3AD203B41FA5}">
-                      <a16:colId xmlns:a16="http://schemas.microsoft.com/office/drawing/2014/main" val="288273637"/>
+                      <a16:colId xmlns:a16="http://schemas.microsoft.com/office/drawing/2014/main" val="758078980"/>
+                    </a:ext>
+                  </a:extLst>
+                </a:gridCol>
+                <a:gridCol w="2164694">
+                  <a:extLst>
+                    <a:ext uri="{9D8B030D-6E8A-4147-A177-3AD203B41FA5}">
+                      <a16:colId xmlns:a16="http://schemas.microsoft.com/office/drawing/2014/main" val="3098581652"/>
                     </a:ext>
                   </a:extLst>
                 </a:gridCol>
               </a:tblGrid>
-              <a:tr h="272811">
+              <a:tr h="527440">
                 <a:tc>
                   <a:txBody>
                     <a:bodyPr/>
@@ -29377,35 +29764,28 @@
                     <a:bodyPr/>
                     <a:lstStyle/>
                     <a:p>
-                      <a:pPr marL="0" marR="0" lvl="0" indent="0" algn="l" defTabSz="914400" rtl="0" eaLnBrk="1" fontAlgn="auto" latinLnBrk="0" hangingPunct="1">
-                        <a:lnSpc>
-                          <a:spcPct val="107000"/>
-                        </a:lnSpc>
-                        <a:spcBef>
-                          <a:spcPts val="0"/>
-                        </a:spcBef>
-                        <a:spcAft>
-                          <a:spcPts val="0"/>
-                        </a:spcAft>
-                        <a:buClrTx/>
-                        <a:buSzTx/>
-                        <a:buFontTx/>
-                        <a:buNone/>
-                        <a:tabLst/>
-                        <a:defRPr/>
-                      </a:pPr>
                       <a:r>
-                        <a:rPr lang="en-US" sz="1800" dirty="0">
+                        <a:rPr lang="en-US" sz="1800">
                           <a:effectLst/>
                         </a:rPr>
                         <a:t>Variable Prefix</a:t>
                       </a:r>
-                      <a:endParaRPr lang="en-US" sz="1800" dirty="0">
-                        <a:effectLst/>
-                        <a:latin typeface="Calibri" panose="020F0502020204030204" pitchFamily="34" charset="0"/>
-                        <a:ea typeface="Calibri" panose="020F0502020204030204" pitchFamily="34" charset="0"/>
-                        <a:cs typeface="Times New Roman" panose="02020603050405020304" pitchFamily="18" charset="0"/>
-                      </a:endParaRPr>
+                      <a:endParaRPr lang="en-US" dirty="0"/>
+                    </a:p>
+                  </a:txBody>
+                  <a:tcPr marL="86320" marR="86320" marT="0" marB="0"/>
+                </a:tc>
+                <a:tc>
+                  <a:txBody>
+                    <a:bodyPr/>
+                    <a:lstStyle/>
+                    <a:p>
+                      <a:r>
+                        <a:rPr lang="en-US" sz="1800" dirty="0">
+                          <a:latin typeface="+mn-lt"/>
+                        </a:rPr>
+                        <a:t>Data Type</a:t>
+                      </a:r>
                     </a:p>
                   </a:txBody>
                   <a:tcPr marL="86320" marR="86320" marT="0" marB="0"/>
@@ -29416,7 +29796,7 @@
                   </a:ext>
                 </a:extLst>
               </a:tr>
-              <a:tr h="434261">
+              <a:tr h="429217">
                 <a:tc>
                   <a:txBody>
                     <a:bodyPr/>
@@ -29457,7 +29837,23 @@
                     <a:bodyPr/>
                     <a:lstStyle/>
                     <a:p>
-                      <a:pPr marL="0" marR="0" lvl="0" indent="0" algn="l" defTabSz="914400" rtl="0" eaLnBrk="1" fontAlgn="auto" latinLnBrk="0" hangingPunct="1">
+                      <a:r>
+                        <a:rPr lang="en-US" sz="1400">
+                          <a:effectLst/>
+                        </a:rPr>
+                        <a:t>En_burden</a:t>
+                      </a:r>
+                      <a:endParaRPr lang="en-US"/>
+                    </a:p>
+                  </a:txBody>
+                  <a:tcPr marL="86320" marR="86320" marT="0" marB="0"/>
+                </a:tc>
+                <a:tc>
+                  <a:txBody>
+                    <a:bodyPr/>
+                    <a:lstStyle/>
+                    <a:p>
+                      <a:pPr marL="0" marR="0">
                         <a:lnSpc>
                           <a:spcPct val="107000"/>
                         </a:lnSpc>
@@ -29467,28 +29863,19 @@
                         <a:spcAft>
                           <a:spcPts val="0"/>
                         </a:spcAft>
-                        <a:buClrTx/>
-                        <a:buSzTx/>
-                        <a:buFontTx/>
-                        <a:buNone/>
-                        <a:tabLst/>
-                        <a:defRPr/>
                       </a:pPr>
                       <a:r>
-                        <a:rPr lang="en-US" sz="1400" dirty="0" err="1">
+                        <a:rPr lang="en-US" sz="1400" dirty="0">
                           <a:effectLst/>
+                          <a:latin typeface="+mn-lt"/>
+                          <a:ea typeface="Calibri" panose="020F0502020204030204" pitchFamily="34" charset="0"/>
+                          <a:cs typeface="Times New Roman" panose="02020603050405020304" pitchFamily="18" charset="0"/>
                         </a:rPr>
-                        <a:t>En_burden</a:t>
+                        <a:t>Continuous, nominal</a:t>
                       </a:r>
-                      <a:endParaRPr lang="en-US" sz="1400" dirty="0">
-                        <a:effectLst/>
-                        <a:latin typeface="Calibri" panose="020F0502020204030204" pitchFamily="34" charset="0"/>
-                        <a:ea typeface="Calibri" panose="020F0502020204030204" pitchFamily="34" charset="0"/>
-                        <a:cs typeface="Times New Roman" panose="02020603050405020304" pitchFamily="18" charset="0"/>
-                      </a:endParaRPr>
                     </a:p>
                   </a:txBody>
-                  <a:tcPr marL="86320" marR="86320" marT="0" marB="0"/>
+                  <a:tcPr marL="68580" marR="68580" marT="0" marB="0"/>
                 </a:tc>
                 <a:extLst>
                   <a:ext uri="{0D108BD9-81ED-4DB2-BD59-A6C34878D82A}">
@@ -29496,7 +29883,7 @@
                   </a:ext>
                 </a:extLst>
               </a:tr>
-              <a:tr h="261773">
+              <a:tr h="251658">
                 <a:tc>
                   <a:txBody>
                     <a:bodyPr/>
@@ -29520,7 +29907,7 @@
                           <a:ea typeface="Calibri" panose="020F0502020204030204" pitchFamily="34" charset="0"/>
                           <a:cs typeface="Times New Roman" panose="02020603050405020304" pitchFamily="18" charset="0"/>
                         </a:rPr>
-                        <a:t>Federal Identification</a:t>
+                        <a:t>Federal Identification #</a:t>
                       </a:r>
                     </a:p>
                   </a:txBody>
@@ -29531,7 +29918,23 @@
                     <a:bodyPr/>
                     <a:lstStyle/>
                     <a:p>
-                      <a:pPr marL="0" marR="0" lvl="0" indent="0" algn="l" defTabSz="914400" rtl="0" eaLnBrk="1" fontAlgn="auto" latinLnBrk="0" hangingPunct="1">
+                      <a:r>
+                        <a:rPr lang="en-US" sz="1400">
+                          <a:effectLst/>
+                        </a:rPr>
+                        <a:t>fip</a:t>
+                      </a:r>
+                      <a:endParaRPr lang="en-US" dirty="0"/>
+                    </a:p>
+                  </a:txBody>
+                  <a:tcPr marL="86320" marR="86320" marT="0" marB="0"/>
+                </a:tc>
+                <a:tc>
+                  <a:txBody>
+                    <a:bodyPr/>
+                    <a:lstStyle/>
+                    <a:p>
+                      <a:pPr marL="0" marR="0">
                         <a:lnSpc>
                           <a:spcPct val="107000"/>
                         </a:lnSpc>
@@ -29541,28 +29944,19 @@
                         <a:spcAft>
                           <a:spcPts val="0"/>
                         </a:spcAft>
-                        <a:buClrTx/>
-                        <a:buSzTx/>
-                        <a:buFontTx/>
-                        <a:buNone/>
-                        <a:tabLst/>
-                        <a:defRPr/>
                       </a:pPr>
                       <a:r>
-                        <a:rPr lang="en-US" sz="1400" dirty="0" err="1">
+                        <a:rPr lang="en-US" sz="1400">
                           <a:effectLst/>
+                          <a:latin typeface="+mn-lt"/>
+                          <a:ea typeface="Calibri" panose="020F0502020204030204" pitchFamily="34" charset="0"/>
+                          <a:cs typeface="Times New Roman" panose="02020603050405020304" pitchFamily="18" charset="0"/>
                         </a:rPr>
-                        <a:t>fip</a:t>
+                        <a:t>Nominal, integer</a:t>
                       </a:r>
-                      <a:endParaRPr lang="en-US" sz="1400" dirty="0">
-                        <a:effectLst/>
-                        <a:latin typeface="Calibri" panose="020F0502020204030204" pitchFamily="34" charset="0"/>
-                        <a:ea typeface="Calibri" panose="020F0502020204030204" pitchFamily="34" charset="0"/>
-                        <a:cs typeface="Times New Roman" panose="02020603050405020304" pitchFamily="18" charset="0"/>
-                      </a:endParaRPr>
                     </a:p>
                   </a:txBody>
-                  <a:tcPr marL="86320" marR="86320" marT="0" marB="0"/>
+                  <a:tcPr marL="68580" marR="68580" marT="0" marB="0"/>
                 </a:tc>
                 <a:extLst>
                   <a:ext uri="{0D108BD9-81ED-4DB2-BD59-A6C34878D82A}">
@@ -29570,7 +29964,7 @@
                   </a:ext>
                 </a:extLst>
               </a:tr>
-              <a:tr h="261773">
+              <a:tr h="251658">
                 <a:tc>
                   <a:txBody>
                     <a:bodyPr/>
@@ -29605,7 +29999,23 @@
                     <a:bodyPr/>
                     <a:lstStyle/>
                     <a:p>
-                      <a:pPr marL="0" marR="0" lvl="0" indent="0" algn="l" defTabSz="914400" rtl="0" eaLnBrk="1" fontAlgn="auto" latinLnBrk="0" hangingPunct="1">
+                      <a:r>
+                        <a:rPr lang="en-US" sz="1400" dirty="0" err="1">
+                          <a:effectLst/>
+                        </a:rPr>
+                        <a:t>cnty</a:t>
+                      </a:r>
+                      <a:endParaRPr lang="en-US" dirty="0"/>
+                    </a:p>
+                  </a:txBody>
+                  <a:tcPr marL="86320" marR="86320" marT="0" marB="0"/>
+                </a:tc>
+                <a:tc>
+                  <a:txBody>
+                    <a:bodyPr/>
+                    <a:lstStyle/>
+                    <a:p>
+                      <a:pPr marL="0" marR="0">
                         <a:lnSpc>
                           <a:spcPct val="107000"/>
                         </a:lnSpc>
@@ -29615,28 +30025,19 @@
                         <a:spcAft>
                           <a:spcPts val="0"/>
                         </a:spcAft>
-                        <a:buClrTx/>
-                        <a:buSzTx/>
-                        <a:buFontTx/>
-                        <a:buNone/>
-                        <a:tabLst/>
-                        <a:defRPr/>
                       </a:pPr>
                       <a:r>
-                        <a:rPr lang="en-US" sz="1400" dirty="0" err="1">
+                        <a:rPr lang="en-US" sz="1400" dirty="0">
                           <a:effectLst/>
+                          <a:latin typeface="+mn-lt"/>
+                          <a:ea typeface="Calibri" panose="020F0502020204030204" pitchFamily="34" charset="0"/>
+                          <a:cs typeface="Times New Roman" panose="02020603050405020304" pitchFamily="18" charset="0"/>
                         </a:rPr>
-                        <a:t>cnty</a:t>
+                        <a:t>Nominal, integer</a:t>
                       </a:r>
-                      <a:endParaRPr lang="en-US" sz="1400" dirty="0">
-                        <a:effectLst/>
-                        <a:latin typeface="Calibri" panose="020F0502020204030204" pitchFamily="34" charset="0"/>
-                        <a:ea typeface="Calibri" panose="020F0502020204030204" pitchFamily="34" charset="0"/>
-                        <a:cs typeface="Times New Roman" panose="02020603050405020304" pitchFamily="18" charset="0"/>
-                      </a:endParaRPr>
                     </a:p>
                   </a:txBody>
-                  <a:tcPr marL="86320" marR="86320" marT="0" marB="0"/>
+                  <a:tcPr marL="68580" marR="68580" marT="0" marB="0"/>
                 </a:tc>
                 <a:extLst>
                   <a:ext uri="{0D108BD9-81ED-4DB2-BD59-A6C34878D82A}">
@@ -29644,8 +30045,8 @@
                   </a:ext>
                 </a:extLst>
               </a:tr>
-              <a:tr h="281873">
-                <a:tc gridSpan="2">
+              <a:tr h="270981">
+                <a:tc gridSpan="3">
                   <a:txBody>
                     <a:bodyPr/>
                     <a:lstStyle/>
@@ -29684,13 +30085,39 @@
                   </a:txBody>
                   <a:tcPr/>
                 </a:tc>
+                <a:tc hMerge="1">
+                  <a:txBody>
+                    <a:bodyPr/>
+                    <a:lstStyle/>
+                    <a:p>
+                      <a:pPr marL="0" marR="0" algn="ctr">
+                        <a:lnSpc>
+                          <a:spcPct val="107000"/>
+                        </a:lnSpc>
+                        <a:spcBef>
+                          <a:spcPts val="0"/>
+                        </a:spcBef>
+                        <a:spcAft>
+                          <a:spcPts val="0"/>
+                        </a:spcAft>
+                      </a:pPr>
+                      <a:endParaRPr lang="en-US" sz="1800" dirty="0">
+                        <a:effectLst/>
+                        <a:latin typeface="Calibri" panose="020F0502020204030204" pitchFamily="34" charset="0"/>
+                        <a:ea typeface="Calibri" panose="020F0502020204030204" pitchFamily="34" charset="0"/>
+                        <a:cs typeface="Times New Roman" panose="02020603050405020304" pitchFamily="18" charset="0"/>
+                      </a:endParaRPr>
+                    </a:p>
+                  </a:txBody>
+                  <a:tcPr marL="86320" marR="86320" marT="0" marB="0"/>
+                </a:tc>
                 <a:extLst>
                   <a:ext uri="{0D108BD9-81ED-4DB2-BD59-A6C34878D82A}">
                     <a16:rowId xmlns:a16="http://schemas.microsoft.com/office/drawing/2014/main" val="2633151730"/>
                   </a:ext>
                 </a:extLst>
               </a:tr>
-              <a:tr h="434261">
+              <a:tr h="306097">
                 <a:tc>
                   <a:txBody>
                     <a:bodyPr/>
@@ -29725,36 +30152,21 @@
                     <a:bodyPr/>
                     <a:lstStyle/>
                     <a:p>
-                      <a:pPr marL="0" marR="0" lvl="0" indent="0" algn="l" defTabSz="914400" rtl="0" eaLnBrk="1" fontAlgn="auto" latinLnBrk="0" hangingPunct="1">
-                        <a:lnSpc>
-                          <a:spcPct val="107000"/>
-                        </a:lnSpc>
-                        <a:spcBef>
-                          <a:spcPts val="0"/>
-                        </a:spcBef>
-                        <a:spcAft>
-                          <a:spcPts val="0"/>
-                        </a:spcAft>
-                        <a:buClrTx/>
-                        <a:buSzTx/>
-                        <a:buFontTx/>
-                        <a:buNone/>
-                        <a:tabLst/>
-                        <a:defRPr/>
-                      </a:pPr>
                       <a:r>
-                        <a:rPr lang="en-US" sz="1400" dirty="0" err="1">
+                        <a:rPr lang="en-US" sz="1400">
                           <a:effectLst/>
                         </a:rPr>
                         <a:t>pcnt_hisp</a:t>
                       </a:r>
-                      <a:endParaRPr lang="en-US" sz="1400" dirty="0">
-                        <a:effectLst/>
-                        <a:latin typeface="Calibri" panose="020F0502020204030204" pitchFamily="34" charset="0"/>
-                        <a:ea typeface="Calibri" panose="020F0502020204030204" pitchFamily="34" charset="0"/>
-                        <a:cs typeface="Times New Roman" panose="02020603050405020304" pitchFamily="18" charset="0"/>
-                      </a:endParaRPr>
+                      <a:endParaRPr lang="en-US"/>
                     </a:p>
+                  </a:txBody>
+                  <a:tcPr marL="86320" marR="86320" marT="0" marB="0"/>
+                </a:tc>
+                <a:tc>
+                  <a:txBody>
+                    <a:bodyPr/>
+                    <a:lstStyle/>
                     <a:p>
                       <a:pPr marL="0" marR="0">
                         <a:lnSpc>
@@ -29767,15 +30179,18 @@
                           <a:spcPts val="0"/>
                         </a:spcAft>
                       </a:pPr>
-                      <a:endParaRPr lang="en-US" sz="1400" dirty="0">
-                        <a:effectLst/>
-                        <a:latin typeface="Calibri" panose="020F0502020204030204" pitchFamily="34" charset="0"/>
-                        <a:ea typeface="Calibri" panose="020F0502020204030204" pitchFamily="34" charset="0"/>
-                        <a:cs typeface="Times New Roman" panose="02020603050405020304" pitchFamily="18" charset="0"/>
-                      </a:endParaRPr>
+                      <a:r>
+                        <a:rPr lang="en-US" sz="1400">
+                          <a:effectLst/>
+                          <a:latin typeface="+mn-lt"/>
+                          <a:ea typeface="Calibri" panose="020F0502020204030204" pitchFamily="34" charset="0"/>
+                          <a:cs typeface="Times New Roman" panose="02020603050405020304" pitchFamily="18" charset="0"/>
+                        </a:rPr>
+                        <a:t>Continuous, numerical</a:t>
+                      </a:r>
                     </a:p>
                   </a:txBody>
-                  <a:tcPr marL="86320" marR="86320" marT="0" marB="0"/>
+                  <a:tcPr marL="68580" marR="68580" marT="0" marB="0"/>
                 </a:tc>
                 <a:extLst>
                   <a:ext uri="{0D108BD9-81ED-4DB2-BD59-A6C34878D82A}">
@@ -29783,7 +30198,7 @@
                   </a:ext>
                 </a:extLst>
               </a:tr>
-              <a:tr h="434261">
+              <a:tr h="429217">
                 <a:tc>
                   <a:txBody>
                     <a:bodyPr/>
@@ -29818,36 +30233,21 @@
                     <a:bodyPr/>
                     <a:lstStyle/>
                     <a:p>
-                      <a:pPr marL="0" marR="0" lvl="0" indent="0" algn="l" defTabSz="914400" rtl="0" eaLnBrk="1" fontAlgn="auto" latinLnBrk="0" hangingPunct="1">
-                        <a:lnSpc>
-                          <a:spcPct val="107000"/>
-                        </a:lnSpc>
-                        <a:spcBef>
-                          <a:spcPts val="0"/>
-                        </a:spcBef>
-                        <a:spcAft>
-                          <a:spcPts val="0"/>
-                        </a:spcAft>
-                        <a:buClrTx/>
-                        <a:buSzTx/>
-                        <a:buFontTx/>
-                        <a:buNone/>
-                        <a:tabLst/>
-                        <a:defRPr/>
-                      </a:pPr>
                       <a:r>
-                        <a:rPr lang="en-US" sz="1400" dirty="0" err="1">
+                        <a:rPr lang="en-US" sz="1400">
                           <a:effectLst/>
                         </a:rPr>
                         <a:t>pcnt_blk</a:t>
                       </a:r>
-                      <a:endParaRPr lang="en-US" sz="1400" dirty="0">
-                        <a:effectLst/>
-                        <a:latin typeface="Calibri" panose="020F0502020204030204" pitchFamily="34" charset="0"/>
-                        <a:ea typeface="Calibri" panose="020F0502020204030204" pitchFamily="34" charset="0"/>
-                        <a:cs typeface="Times New Roman" panose="02020603050405020304" pitchFamily="18" charset="0"/>
-                      </a:endParaRPr>
+                      <a:endParaRPr lang="en-US" dirty="0"/>
                     </a:p>
+                  </a:txBody>
+                  <a:tcPr marL="86320" marR="86320" marT="0" marB="0"/>
+                </a:tc>
+                <a:tc>
+                  <a:txBody>
+                    <a:bodyPr/>
+                    <a:lstStyle/>
                     <a:p>
                       <a:pPr marL="0" marR="0">
                         <a:lnSpc>
@@ -29860,15 +30260,18 @@
                           <a:spcPts val="0"/>
                         </a:spcAft>
                       </a:pPr>
-                      <a:endParaRPr lang="en-US" sz="1400" dirty="0">
-                        <a:effectLst/>
-                        <a:latin typeface="Calibri" panose="020F0502020204030204" pitchFamily="34" charset="0"/>
-                        <a:ea typeface="Calibri" panose="020F0502020204030204" pitchFamily="34" charset="0"/>
-                        <a:cs typeface="Times New Roman" panose="02020603050405020304" pitchFamily="18" charset="0"/>
-                      </a:endParaRPr>
+                      <a:r>
+                        <a:rPr lang="en-US" sz="1400" dirty="0">
+                          <a:effectLst/>
+                          <a:latin typeface="+mn-lt"/>
+                          <a:ea typeface="Calibri" panose="020F0502020204030204" pitchFamily="34" charset="0"/>
+                          <a:cs typeface="Times New Roman" panose="02020603050405020304" pitchFamily="18" charset="0"/>
+                        </a:rPr>
+                        <a:t>Continuous, numerical</a:t>
+                      </a:r>
                     </a:p>
                   </a:txBody>
-                  <a:tcPr marL="86320" marR="86320" marT="0" marB="0"/>
+                  <a:tcPr marL="68580" marR="68580" marT="0" marB="0"/>
                 </a:tc>
                 <a:extLst>
                   <a:ext uri="{0D108BD9-81ED-4DB2-BD59-A6C34878D82A}">
@@ -29876,7 +30279,7 @@
                   </a:ext>
                 </a:extLst>
               </a:tr>
-              <a:tr h="261773">
+              <a:tr h="251658">
                 <a:tc>
                   <a:txBody>
                     <a:bodyPr/>
@@ -29911,7 +30314,23 @@
                     <a:bodyPr/>
                     <a:lstStyle/>
                     <a:p>
-                      <a:pPr marL="0" marR="0" lvl="0" indent="0" algn="l" defTabSz="914400" rtl="0" eaLnBrk="1" fontAlgn="auto" latinLnBrk="0" hangingPunct="1">
+                      <a:r>
+                        <a:rPr lang="en-US" sz="1400">
+                          <a:effectLst/>
+                        </a:rPr>
+                        <a:t>pcnt_rural</a:t>
+                      </a:r>
+                      <a:endParaRPr lang="en-US" dirty="0"/>
+                    </a:p>
+                  </a:txBody>
+                  <a:tcPr marL="86320" marR="86320" marT="0" marB="0"/>
+                </a:tc>
+                <a:tc>
+                  <a:txBody>
+                    <a:bodyPr/>
+                    <a:lstStyle/>
+                    <a:p>
+                      <a:pPr marL="0" marR="0">
                         <a:lnSpc>
                           <a:spcPct val="107000"/>
                         </a:lnSpc>
@@ -29921,28 +30340,19 @@
                         <a:spcAft>
                           <a:spcPts val="0"/>
                         </a:spcAft>
-                        <a:buClrTx/>
-                        <a:buSzTx/>
-                        <a:buFontTx/>
-                        <a:buNone/>
-                        <a:tabLst/>
-                        <a:defRPr/>
                       </a:pPr>
                       <a:r>
-                        <a:rPr lang="en-US" sz="1400" dirty="0" err="1">
+                        <a:rPr lang="en-US" sz="1400">
                           <a:effectLst/>
+                          <a:latin typeface="+mn-lt"/>
+                          <a:ea typeface="Calibri" panose="020F0502020204030204" pitchFamily="34" charset="0"/>
+                          <a:cs typeface="Times New Roman" panose="02020603050405020304" pitchFamily="18" charset="0"/>
                         </a:rPr>
-                        <a:t>pcnt_rural</a:t>
+                        <a:t>Continuous, numerical</a:t>
                       </a:r>
-                      <a:endParaRPr lang="en-US" sz="1400" dirty="0">
-                        <a:effectLst/>
-                        <a:latin typeface="Calibri" panose="020F0502020204030204" pitchFamily="34" charset="0"/>
-                        <a:ea typeface="Calibri" panose="020F0502020204030204" pitchFamily="34" charset="0"/>
-                        <a:cs typeface="Times New Roman" panose="02020603050405020304" pitchFamily="18" charset="0"/>
-                      </a:endParaRPr>
                     </a:p>
                   </a:txBody>
-                  <a:tcPr marL="86320" marR="86320" marT="0" marB="0"/>
+                  <a:tcPr marL="68580" marR="68580" marT="0" marB="0"/>
                 </a:tc>
                 <a:extLst>
                   <a:ext uri="{0D108BD9-81ED-4DB2-BD59-A6C34878D82A}">
@@ -29950,7 +30360,7 @@
                   </a:ext>
                 </a:extLst>
               </a:tr>
-              <a:tr h="261773">
+              <a:tr h="251658">
                 <a:tc>
                   <a:txBody>
                     <a:bodyPr/>
@@ -29985,7 +30395,23 @@
                     <a:bodyPr/>
                     <a:lstStyle/>
                     <a:p>
-                      <a:pPr marL="0" marR="0" lvl="0" indent="0" algn="l" defTabSz="914400" rtl="0" eaLnBrk="1" fontAlgn="auto" latinLnBrk="0" hangingPunct="1">
+                      <a:r>
+                        <a:rPr lang="en-US" sz="1400" dirty="0" err="1">
+                          <a:effectLst/>
+                        </a:rPr>
+                        <a:t>pcnt_sr</a:t>
+                      </a:r>
+                      <a:endParaRPr lang="en-US" dirty="0"/>
+                    </a:p>
+                  </a:txBody>
+                  <a:tcPr marL="86320" marR="86320" marT="0" marB="0"/>
+                </a:tc>
+                <a:tc>
+                  <a:txBody>
+                    <a:bodyPr/>
+                    <a:lstStyle/>
+                    <a:p>
+                      <a:pPr marL="0" marR="0">
                         <a:lnSpc>
                           <a:spcPct val="107000"/>
                         </a:lnSpc>
@@ -29995,28 +30421,19 @@
                         <a:spcAft>
                           <a:spcPts val="0"/>
                         </a:spcAft>
-                        <a:buClrTx/>
-                        <a:buSzTx/>
-                        <a:buFontTx/>
-                        <a:buNone/>
-                        <a:tabLst/>
-                        <a:defRPr/>
                       </a:pPr>
                       <a:r>
-                        <a:rPr lang="en-US" sz="1400" dirty="0" err="1">
+                        <a:rPr lang="en-US" sz="1400" dirty="0">
                           <a:effectLst/>
+                          <a:latin typeface="+mn-lt"/>
+                          <a:ea typeface="Calibri" panose="020F0502020204030204" pitchFamily="34" charset="0"/>
+                          <a:cs typeface="Times New Roman" panose="02020603050405020304" pitchFamily="18" charset="0"/>
                         </a:rPr>
-                        <a:t>pcnt_sr</a:t>
+                        <a:t>Continuous, numerical</a:t>
                       </a:r>
-                      <a:endParaRPr lang="en-US" sz="1400" dirty="0">
-                        <a:effectLst/>
-                        <a:latin typeface="Calibri" panose="020F0502020204030204" pitchFamily="34" charset="0"/>
-                        <a:ea typeface="Calibri" panose="020F0502020204030204" pitchFamily="34" charset="0"/>
-                        <a:cs typeface="Times New Roman" panose="02020603050405020304" pitchFamily="18" charset="0"/>
-                      </a:endParaRPr>
                     </a:p>
                   </a:txBody>
-                  <a:tcPr marL="86320" marR="86320" marT="0" marB="0"/>
+                  <a:tcPr marL="68580" marR="68580" marT="0" marB="0"/>
                 </a:tc>
                 <a:extLst>
                   <a:ext uri="{0D108BD9-81ED-4DB2-BD59-A6C34878D82A}">
@@ -30024,8 +30441,8 @@
                   </a:ext>
                 </a:extLst>
               </a:tr>
-              <a:tr h="281873">
-                <a:tc gridSpan="2">
+              <a:tr h="270981">
+                <a:tc gridSpan="3">
                   <a:txBody>
                     <a:bodyPr/>
                     <a:lstStyle/>
@@ -30064,13 +30481,39 @@
                   </a:txBody>
                   <a:tcPr/>
                 </a:tc>
+                <a:tc hMerge="1">
+                  <a:txBody>
+                    <a:bodyPr/>
+                    <a:lstStyle/>
+                    <a:p>
+                      <a:pPr marL="0" marR="0" algn="ctr">
+                        <a:lnSpc>
+                          <a:spcPct val="107000"/>
+                        </a:lnSpc>
+                        <a:spcBef>
+                          <a:spcPts val="0"/>
+                        </a:spcBef>
+                        <a:spcAft>
+                          <a:spcPts val="0"/>
+                        </a:spcAft>
+                      </a:pPr>
+                      <a:endParaRPr lang="en-US" sz="1800" dirty="0">
+                        <a:effectLst/>
+                        <a:latin typeface="Calibri" panose="020F0502020204030204" pitchFamily="34" charset="0"/>
+                        <a:ea typeface="Calibri" panose="020F0502020204030204" pitchFamily="34" charset="0"/>
+                        <a:cs typeface="Times New Roman" panose="02020603050405020304" pitchFamily="18" charset="0"/>
+                      </a:endParaRPr>
+                    </a:p>
+                  </a:txBody>
+                  <a:tcPr marL="86320" marR="86320" marT="0" marB="0"/>
+                </a:tc>
                 <a:extLst>
                   <a:ext uri="{0D108BD9-81ED-4DB2-BD59-A6C34878D82A}">
                     <a16:rowId xmlns:a16="http://schemas.microsoft.com/office/drawing/2014/main" val="321035522"/>
                   </a:ext>
                 </a:extLst>
               </a:tr>
-              <a:tr h="261773">
+              <a:tr h="251658">
                 <a:tc>
                   <a:txBody>
                     <a:bodyPr/>
@@ -30105,7 +30548,23 @@
                     <a:bodyPr/>
                     <a:lstStyle/>
                     <a:p>
-                      <a:pPr marL="0" marR="0" lvl="0" indent="0" algn="l" defTabSz="914400" rtl="0" eaLnBrk="1" fontAlgn="auto" latinLnBrk="0" hangingPunct="1">
+                      <a:r>
+                        <a:rPr lang="en-US" sz="1400">
+                          <a:effectLst/>
+                        </a:rPr>
+                        <a:t>pcnt_unemp</a:t>
+                      </a:r>
+                      <a:endParaRPr lang="en-US"/>
+                    </a:p>
+                  </a:txBody>
+                  <a:tcPr marL="86320" marR="86320" marT="0" marB="0"/>
+                </a:tc>
+                <a:tc>
+                  <a:txBody>
+                    <a:bodyPr/>
+                    <a:lstStyle/>
+                    <a:p>
+                      <a:pPr marL="0" marR="0">
                         <a:lnSpc>
                           <a:spcPct val="107000"/>
                         </a:lnSpc>
@@ -30115,28 +30574,19 @@
                         <a:spcAft>
                           <a:spcPts val="0"/>
                         </a:spcAft>
-                        <a:buClrTx/>
-                        <a:buSzTx/>
-                        <a:buFontTx/>
-                        <a:buNone/>
-                        <a:tabLst/>
-                        <a:defRPr/>
                       </a:pPr>
                       <a:r>
-                        <a:rPr lang="en-US" sz="1400" dirty="0" err="1">
+                        <a:rPr lang="en-US" sz="1400">
                           <a:effectLst/>
+                          <a:latin typeface="+mn-lt"/>
+                          <a:ea typeface="Calibri" panose="020F0502020204030204" pitchFamily="34" charset="0"/>
+                          <a:cs typeface="Times New Roman" panose="02020603050405020304" pitchFamily="18" charset="0"/>
                         </a:rPr>
-                        <a:t>pcnt_unemp</a:t>
+                        <a:t>Continuous, numerical</a:t>
                       </a:r>
-                      <a:endParaRPr lang="en-US" sz="1400" dirty="0">
-                        <a:effectLst/>
-                        <a:latin typeface="Calibri" panose="020F0502020204030204" pitchFamily="34" charset="0"/>
-                        <a:ea typeface="Calibri" panose="020F0502020204030204" pitchFamily="34" charset="0"/>
-                        <a:cs typeface="Times New Roman" panose="02020603050405020304" pitchFamily="18" charset="0"/>
-                      </a:endParaRPr>
                     </a:p>
                   </a:txBody>
-                  <a:tcPr marL="86320" marR="86320" marT="0" marB="0"/>
+                  <a:tcPr marL="68580" marR="68580" marT="0" marB="0"/>
                 </a:tc>
                 <a:extLst>
                   <a:ext uri="{0D108BD9-81ED-4DB2-BD59-A6C34878D82A}">
@@ -30144,7 +30594,7 @@
                   </a:ext>
                 </a:extLst>
               </a:tr>
-              <a:tr h="434261">
+              <a:tr h="417481">
                 <a:tc>
                   <a:txBody>
                     <a:bodyPr/>
@@ -30179,36 +30629,21 @@
                     <a:bodyPr/>
                     <a:lstStyle/>
                     <a:p>
-                      <a:pPr marL="0" marR="0" lvl="0" indent="0" algn="l" defTabSz="914400" rtl="0" eaLnBrk="1" fontAlgn="auto" latinLnBrk="0" hangingPunct="1">
-                        <a:lnSpc>
-                          <a:spcPct val="107000"/>
-                        </a:lnSpc>
-                        <a:spcBef>
-                          <a:spcPts val="0"/>
-                        </a:spcBef>
-                        <a:spcAft>
-                          <a:spcPts val="0"/>
-                        </a:spcAft>
-                        <a:buClrTx/>
-                        <a:buSzTx/>
-                        <a:buFontTx/>
-                        <a:buNone/>
-                        <a:tabLst/>
-                        <a:defRPr/>
-                      </a:pPr>
                       <a:r>
-                        <a:rPr lang="en-US" sz="1400" dirty="0" err="1">
+                        <a:rPr lang="en-US" sz="1400">
                           <a:effectLst/>
                         </a:rPr>
                         <a:t>pcnt_pov</a:t>
                       </a:r>
-                      <a:endParaRPr lang="en-US" sz="1400" dirty="0">
-                        <a:effectLst/>
-                        <a:latin typeface="Calibri" panose="020F0502020204030204" pitchFamily="34" charset="0"/>
-                        <a:ea typeface="Calibri" panose="020F0502020204030204" pitchFamily="34" charset="0"/>
-                        <a:cs typeface="Times New Roman" panose="02020603050405020304" pitchFamily="18" charset="0"/>
-                      </a:endParaRPr>
+                      <a:endParaRPr lang="en-US" dirty="0"/>
                     </a:p>
+                  </a:txBody>
+                  <a:tcPr marL="86320" marR="86320" marT="0" marB="0"/>
+                </a:tc>
+                <a:tc>
+                  <a:txBody>
+                    <a:bodyPr/>
+                    <a:lstStyle/>
                     <a:p>
                       <a:pPr marL="0" marR="0">
                         <a:lnSpc>
@@ -30221,15 +30656,18 @@
                           <a:spcPts val="0"/>
                         </a:spcAft>
                       </a:pPr>
-                      <a:endParaRPr lang="en-US" sz="1400" dirty="0">
-                        <a:effectLst/>
-                        <a:latin typeface="Calibri" panose="020F0502020204030204" pitchFamily="34" charset="0"/>
-                        <a:ea typeface="Calibri" panose="020F0502020204030204" pitchFamily="34" charset="0"/>
-                        <a:cs typeface="Times New Roman" panose="02020603050405020304" pitchFamily="18" charset="0"/>
-                      </a:endParaRPr>
+                      <a:r>
+                        <a:rPr lang="en-US" sz="1400">
+                          <a:effectLst/>
+                          <a:latin typeface="+mn-lt"/>
+                          <a:ea typeface="Calibri" panose="020F0502020204030204" pitchFamily="34" charset="0"/>
+                          <a:cs typeface="Times New Roman" panose="02020603050405020304" pitchFamily="18" charset="0"/>
+                        </a:rPr>
+                        <a:t>Continuous, numerical</a:t>
+                      </a:r>
                     </a:p>
                   </a:txBody>
-                  <a:tcPr marL="86320" marR="86320" marT="0" marB="0"/>
+                  <a:tcPr marL="68580" marR="68580" marT="0" marB="0"/>
                 </a:tc>
                 <a:extLst>
                   <a:ext uri="{0D108BD9-81ED-4DB2-BD59-A6C34878D82A}">
@@ -30237,7 +30675,7 @@
                   </a:ext>
                 </a:extLst>
               </a:tr>
-              <a:tr h="434261">
+              <a:tr h="429217">
                 <a:tc>
                   <a:txBody>
                     <a:bodyPr/>
@@ -30272,36 +30710,21 @@
                     <a:bodyPr/>
                     <a:lstStyle/>
                     <a:p>
-                      <a:pPr marL="0" marR="0" lvl="0" indent="0" algn="l" defTabSz="914400" rtl="0" eaLnBrk="1" fontAlgn="auto" latinLnBrk="0" hangingPunct="1">
-                        <a:lnSpc>
-                          <a:spcPct val="107000"/>
-                        </a:lnSpc>
-                        <a:spcBef>
-                          <a:spcPts val="0"/>
-                        </a:spcBef>
-                        <a:spcAft>
-                          <a:spcPts val="0"/>
-                        </a:spcAft>
-                        <a:buClrTx/>
-                        <a:buSzTx/>
-                        <a:buFontTx/>
-                        <a:buNone/>
-                        <a:tabLst/>
-                        <a:defRPr/>
-                      </a:pPr>
                       <a:r>
-                        <a:rPr lang="en-US" sz="1400" dirty="0" err="1">
+                        <a:rPr lang="en-US" sz="1400">
                           <a:effectLst/>
                         </a:rPr>
                         <a:t>pcnt_income</a:t>
                       </a:r>
-                      <a:endParaRPr lang="en-US" sz="1400" dirty="0">
-                        <a:effectLst/>
-                        <a:latin typeface="Calibri" panose="020F0502020204030204" pitchFamily="34" charset="0"/>
-                        <a:ea typeface="Calibri" panose="020F0502020204030204" pitchFamily="34" charset="0"/>
-                        <a:cs typeface="Times New Roman" panose="02020603050405020304" pitchFamily="18" charset="0"/>
-                      </a:endParaRPr>
+                      <a:endParaRPr lang="en-US" dirty="0"/>
                     </a:p>
+                  </a:txBody>
+                  <a:tcPr marL="86320" marR="86320" marT="0" marB="0"/>
+                </a:tc>
+                <a:tc>
+                  <a:txBody>
+                    <a:bodyPr/>
+                    <a:lstStyle/>
                     <a:p>
                       <a:pPr marL="0" marR="0">
                         <a:lnSpc>
@@ -30314,15 +30737,18 @@
                           <a:spcPts val="0"/>
                         </a:spcAft>
                       </a:pPr>
-                      <a:endParaRPr lang="en-US" sz="1400" dirty="0">
-                        <a:effectLst/>
-                        <a:latin typeface="Calibri" panose="020F0502020204030204" pitchFamily="34" charset="0"/>
-                        <a:ea typeface="Calibri" panose="020F0502020204030204" pitchFamily="34" charset="0"/>
-                        <a:cs typeface="Times New Roman" panose="02020603050405020304" pitchFamily="18" charset="0"/>
-                      </a:endParaRPr>
+                      <a:r>
+                        <a:rPr lang="en-US" sz="1400">
+                          <a:effectLst/>
+                          <a:latin typeface="+mn-lt"/>
+                          <a:ea typeface="Calibri" panose="020F0502020204030204" pitchFamily="34" charset="0"/>
+                          <a:cs typeface="Times New Roman" panose="02020603050405020304" pitchFamily="18" charset="0"/>
+                        </a:rPr>
+                        <a:t>Continuous, numerical</a:t>
+                      </a:r>
                     </a:p>
                   </a:txBody>
-                  <a:tcPr marL="86320" marR="86320" marT="0" marB="0"/>
+                  <a:tcPr marL="68580" marR="68580" marT="0" marB="0"/>
                 </a:tc>
                 <a:extLst>
                   <a:ext uri="{0D108BD9-81ED-4DB2-BD59-A6C34878D82A}">
@@ -30330,7 +30756,7 @@
                   </a:ext>
                 </a:extLst>
               </a:tr>
-              <a:tr h="434261">
+              <a:tr h="429217">
                 <a:tc>
                   <a:txBody>
                     <a:bodyPr/>
@@ -30365,36 +30791,21 @@
                     <a:bodyPr/>
                     <a:lstStyle/>
                     <a:p>
-                      <a:pPr marL="0" marR="0" lvl="0" indent="0" algn="l" defTabSz="914400" rtl="0" eaLnBrk="1" fontAlgn="auto" latinLnBrk="0" hangingPunct="1">
-                        <a:lnSpc>
-                          <a:spcPct val="107000"/>
-                        </a:lnSpc>
-                        <a:spcBef>
-                          <a:spcPts val="0"/>
-                        </a:spcBef>
-                        <a:spcAft>
-                          <a:spcPts val="0"/>
-                        </a:spcAft>
-                        <a:buClrTx/>
-                        <a:buSzTx/>
-                        <a:buFontTx/>
-                        <a:buNone/>
-                        <a:tabLst/>
-                        <a:defRPr/>
-                      </a:pPr>
                       <a:r>
                         <a:rPr lang="en-US" sz="1400" dirty="0" err="1">
                           <a:effectLst/>
                         </a:rPr>
                         <a:t>pcnt_own</a:t>
                       </a:r>
-                      <a:endParaRPr lang="en-US" sz="1400" dirty="0">
-                        <a:effectLst/>
-                        <a:latin typeface="Calibri" panose="020F0502020204030204" pitchFamily="34" charset="0"/>
-                        <a:ea typeface="Calibri" panose="020F0502020204030204" pitchFamily="34" charset="0"/>
-                        <a:cs typeface="Times New Roman" panose="02020603050405020304" pitchFamily="18" charset="0"/>
-                      </a:endParaRPr>
+                      <a:endParaRPr lang="en-US" dirty="0"/>
                     </a:p>
+                  </a:txBody>
+                  <a:tcPr marL="86320" marR="86320" marT="0" marB="0"/>
+                </a:tc>
+                <a:tc>
+                  <a:txBody>
+                    <a:bodyPr/>
+                    <a:lstStyle/>
                     <a:p>
                       <a:pPr marL="0" marR="0">
                         <a:lnSpc>
@@ -30407,15 +30818,18 @@
                           <a:spcPts val="0"/>
                         </a:spcAft>
                       </a:pPr>
-                      <a:endParaRPr lang="en-US" sz="1400" dirty="0">
-                        <a:effectLst/>
-                        <a:latin typeface="Calibri" panose="020F0502020204030204" pitchFamily="34" charset="0"/>
-                        <a:ea typeface="Calibri" panose="020F0502020204030204" pitchFamily="34" charset="0"/>
-                        <a:cs typeface="Times New Roman" panose="02020603050405020304" pitchFamily="18" charset="0"/>
-                      </a:endParaRPr>
+                      <a:r>
+                        <a:rPr lang="en-US" sz="1400" dirty="0">
+                          <a:effectLst/>
+                          <a:latin typeface="+mn-lt"/>
+                          <a:ea typeface="Calibri" panose="020F0502020204030204" pitchFamily="34" charset="0"/>
+                          <a:cs typeface="Times New Roman" panose="02020603050405020304" pitchFamily="18" charset="0"/>
+                        </a:rPr>
+                        <a:t>Continuous, numerical</a:t>
+                      </a:r>
                     </a:p>
                   </a:txBody>
-                  <a:tcPr marL="86320" marR="86320" marT="0" marB="0"/>
+                  <a:tcPr marL="68580" marR="68580" marT="0" marB="0"/>
                 </a:tc>
                 <a:extLst>
                   <a:ext uri="{0D108BD9-81ED-4DB2-BD59-A6C34878D82A}">
@@ -30423,8 +30837,8 @@
                   </a:ext>
                 </a:extLst>
               </a:tr>
-              <a:tr h="272811">
-                <a:tc gridSpan="2">
+              <a:tr h="269642">
+                <a:tc gridSpan="3">
                   <a:txBody>
                     <a:bodyPr/>
                     <a:lstStyle/>
@@ -30463,13 +30877,39 @@
                   </a:txBody>
                   <a:tcPr/>
                 </a:tc>
+                <a:tc hMerge="1">
+                  <a:txBody>
+                    <a:bodyPr/>
+                    <a:lstStyle/>
+                    <a:p>
+                      <a:pPr marL="0" marR="0" algn="ctr">
+                        <a:lnSpc>
+                          <a:spcPct val="107000"/>
+                        </a:lnSpc>
+                        <a:spcBef>
+                          <a:spcPts val="0"/>
+                        </a:spcBef>
+                        <a:spcAft>
+                          <a:spcPts val="0"/>
+                        </a:spcAft>
+                      </a:pPr>
+                      <a:endParaRPr lang="en-US" sz="1800" dirty="0">
+                        <a:effectLst/>
+                        <a:latin typeface="Calibri" panose="020F0502020204030204" pitchFamily="34" charset="0"/>
+                        <a:ea typeface="Calibri" panose="020F0502020204030204" pitchFamily="34" charset="0"/>
+                        <a:cs typeface="Times New Roman" panose="02020603050405020304" pitchFamily="18" charset="0"/>
+                      </a:endParaRPr>
+                    </a:p>
+                  </a:txBody>
+                  <a:tcPr marL="86320" marR="86320" marT="0" marB="0"/>
+                </a:tc>
                 <a:extLst>
                   <a:ext uri="{0D108BD9-81ED-4DB2-BD59-A6C34878D82A}">
                     <a16:rowId xmlns:a16="http://schemas.microsoft.com/office/drawing/2014/main" val="3979493383"/>
                   </a:ext>
                 </a:extLst>
               </a:tr>
-              <a:tr h="434261">
+              <a:tr h="429217">
                 <a:tc>
                   <a:txBody>
                     <a:bodyPr/>
@@ -30516,7 +30956,7 @@
                         </a:spcAft>
                       </a:pPr>
                       <a:r>
-                        <a:rPr lang="en-US" sz="1400" dirty="0" err="1">
+                        <a:rPr lang="en-US" sz="1400">
                           <a:effectLst/>
                         </a:rPr>
                         <a:t>pcnt_lw_access</a:t>
@@ -30531,13 +30971,42 @@
                   </a:txBody>
                   <a:tcPr marL="86320" marR="86320" marT="0" marB="0"/>
                 </a:tc>
+                <a:tc>
+                  <a:txBody>
+                    <a:bodyPr/>
+                    <a:lstStyle/>
+                    <a:p>
+                      <a:pPr marL="0" marR="0">
+                        <a:lnSpc>
+                          <a:spcPct val="107000"/>
+                        </a:lnSpc>
+                        <a:spcBef>
+                          <a:spcPts val="0"/>
+                        </a:spcBef>
+                        <a:spcAft>
+                          <a:spcPts val="0"/>
+                        </a:spcAft>
+                      </a:pPr>
+                      <a:r>
+                        <a:rPr lang="en-US" sz="1400">
+                          <a:effectLst/>
+                          <a:latin typeface="+mn-lt"/>
+                          <a:ea typeface="Calibri" panose="020F0502020204030204" pitchFamily="34" charset="0"/>
+                          <a:cs typeface="Times New Roman" panose="02020603050405020304" pitchFamily="18" charset="0"/>
+                        </a:rPr>
+                        <a:t>Continuous, numerical</a:t>
+                      </a:r>
+                    </a:p>
+                  </a:txBody>
+                  <a:tcPr marL="68580" marR="68580" marT="0" marB="0"/>
+                </a:tc>
                 <a:extLst>
                   <a:ext uri="{0D108BD9-81ED-4DB2-BD59-A6C34878D82A}">
                     <a16:rowId xmlns:a16="http://schemas.microsoft.com/office/drawing/2014/main" val="2199309544"/>
                   </a:ext>
                 </a:extLst>
               </a:tr>
-              <a:tr h="261773">
+              <a:tr h="251658">
                 <a:tc>
                   <a:txBody>
                     <a:bodyPr/>
@@ -30584,7 +31053,7 @@
                         </a:spcAft>
                       </a:pPr>
                       <a:r>
-                        <a:rPr lang="en-US" sz="1400" dirty="0" err="1">
+                        <a:rPr lang="en-US" sz="1400">
                           <a:effectLst/>
                         </a:rPr>
                         <a:t>pcnt_obese</a:t>
@@ -30599,13 +31068,42 @@
                   </a:txBody>
                   <a:tcPr marL="86320" marR="86320" marT="0" marB="0"/>
                 </a:tc>
+                <a:tc>
+                  <a:txBody>
+                    <a:bodyPr/>
+                    <a:lstStyle/>
+                    <a:p>
+                      <a:pPr marL="0" marR="0">
+                        <a:lnSpc>
+                          <a:spcPct val="107000"/>
+                        </a:lnSpc>
+                        <a:spcBef>
+                          <a:spcPts val="0"/>
+                        </a:spcBef>
+                        <a:spcAft>
+                          <a:spcPts val="0"/>
+                        </a:spcAft>
+                      </a:pPr>
+                      <a:r>
+                        <a:rPr lang="en-US" sz="1400">
+                          <a:effectLst/>
+                          <a:latin typeface="+mn-lt"/>
+                          <a:ea typeface="Calibri" panose="020F0502020204030204" pitchFamily="34" charset="0"/>
+                          <a:cs typeface="Times New Roman" panose="02020603050405020304" pitchFamily="18" charset="0"/>
+                        </a:rPr>
+                        <a:t>Continuous, numerical</a:t>
+                      </a:r>
+                    </a:p>
+                  </a:txBody>
+                  <a:tcPr marL="68580" marR="68580" marT="0" marB="0"/>
+                </a:tc>
                 <a:extLst>
                   <a:ext uri="{0D108BD9-81ED-4DB2-BD59-A6C34878D82A}">
                     <a16:rowId xmlns:a16="http://schemas.microsoft.com/office/drawing/2014/main" val="4266315575"/>
                   </a:ext>
                 </a:extLst>
               </a:tr>
-              <a:tr h="261773">
+              <a:tr h="428118">
                 <a:tc>
                   <a:txBody>
                     <a:bodyPr/>
@@ -30652,22 +31150,10 @@
                         </a:spcAft>
                       </a:pPr>
                       <a:r>
-                        <a:rPr lang="en-US" sz="1400" dirty="0" err="1">
+                        <a:rPr lang="en-US" sz="1400">
                           <a:effectLst/>
                         </a:rPr>
-                        <a:t>food_insec</a:t>
-                      </a:r>
-                      <a:r>
-                        <a:rPr lang="en-US" sz="1400" dirty="0">
-                          <a:effectLst/>
-                        </a:rPr>
-                        <a:t> or </a:t>
-                      </a:r>
-                      <a:r>
-                        <a:rPr lang="en-US" sz="1400" dirty="0" err="1">
-                          <a:effectLst/>
-                        </a:rPr>
-                        <a:t>food_rank</a:t>
+                        <a:t>food_insec or food_rank</a:t>
                       </a:r>
                       <a:endParaRPr lang="en-US" sz="1400" dirty="0">
                         <a:effectLst/>
@@ -30679,13 +31165,42 @@
                   </a:txBody>
                   <a:tcPr marL="86320" marR="86320" marT="0" marB="0"/>
                 </a:tc>
+                <a:tc>
+                  <a:txBody>
+                    <a:bodyPr/>
+                    <a:lstStyle/>
+                    <a:p>
+                      <a:pPr marL="0" marR="0">
+                        <a:lnSpc>
+                          <a:spcPct val="107000"/>
+                        </a:lnSpc>
+                        <a:spcBef>
+                          <a:spcPts val="0"/>
+                        </a:spcBef>
+                        <a:spcAft>
+                          <a:spcPts val="0"/>
+                        </a:spcAft>
+                      </a:pPr>
+                      <a:r>
+                        <a:rPr lang="en-US" sz="1400">
+                          <a:effectLst/>
+                          <a:latin typeface="+mn-lt"/>
+                          <a:ea typeface="Calibri" panose="020F0502020204030204" pitchFamily="34" charset="0"/>
+                          <a:cs typeface="Times New Roman" panose="02020603050405020304" pitchFamily="18" charset="0"/>
+                        </a:rPr>
+                        <a:t>Continuous, numerical</a:t>
+                      </a:r>
+                    </a:p>
+                  </a:txBody>
+                  <a:tcPr marL="68580" marR="68580" marT="0" marB="0"/>
+                </a:tc>
                 <a:extLst>
                   <a:ext uri="{0D108BD9-81ED-4DB2-BD59-A6C34878D82A}">
                     <a16:rowId xmlns:a16="http://schemas.microsoft.com/office/drawing/2014/main" val="686802102"/>
                   </a:ext>
                 </a:extLst>
               </a:tr>
-              <a:tr h="261773">
+              <a:tr h="251658">
                 <a:tc>
                   <a:txBody>
                     <a:bodyPr/>
@@ -30747,6 +31262,35 @@
                   </a:txBody>
                   <a:tcPr marL="86320" marR="86320" marT="0" marB="0"/>
                 </a:tc>
+                <a:tc>
+                  <a:txBody>
+                    <a:bodyPr/>
+                    <a:lstStyle/>
+                    <a:p>
+                      <a:pPr marL="0" marR="0">
+                        <a:lnSpc>
+                          <a:spcPct val="107000"/>
+                        </a:lnSpc>
+                        <a:spcBef>
+                          <a:spcPts val="0"/>
+                        </a:spcBef>
+                        <a:spcAft>
+                          <a:spcPts val="0"/>
+                        </a:spcAft>
+                      </a:pPr>
+                      <a:r>
+                        <a:rPr lang="en-US" sz="1400" dirty="0">
+                          <a:effectLst/>
+                          <a:latin typeface="+mn-lt"/>
+                          <a:ea typeface="Calibri" panose="020F0502020204030204" pitchFamily="34" charset="0"/>
+                          <a:cs typeface="Times New Roman" panose="02020603050405020304" pitchFamily="18" charset="0"/>
+                        </a:rPr>
+                        <a:t>Continuous, numerical</a:t>
+                      </a:r>
+                    </a:p>
+                  </a:txBody>
+                  <a:tcPr marL="68580" marR="68580" marT="0" marB="0"/>
+                </a:tc>
                 <a:extLst>
                   <a:ext uri="{0D108BD9-81ED-4DB2-BD59-A6C34878D82A}">
                     <a16:rowId xmlns:a16="http://schemas.microsoft.com/office/drawing/2014/main" val="1176399650"/>
@@ -30757,391 +31301,531 @@
           </a:graphicData>
         </a:graphic>
       </p:graphicFrame>
-      <p:pic>
-        <p:nvPicPr>
-          <p:cNvPr id="33" name="Picture 32">
-            <a:extLst>
-              <a:ext uri="{FF2B5EF4-FFF2-40B4-BE49-F238E27FC236}">
-                <a16:creationId xmlns:a16="http://schemas.microsoft.com/office/drawing/2014/main" id="{57878C3A-5C08-4390-BE03-A8905BB16348}"/>
-              </a:ext>
-            </a:extLst>
-          </p:cNvPr>
-          <p:cNvPicPr>
-            <a:picLocks noChangeAspect="1"/>
-          </p:cNvPicPr>
-          <p:nvPr/>
-        </p:nvPicPr>
-        <p:blipFill rotWithShape="1">
-          <a:blip r:embed="rId2">
-            <a:extLst>
-              <a:ext uri="{837473B0-CC2E-450A-ABE3-18F120FF3D39}">
-                <a1611:picAttrSrcUrl xmlns:a1611="http://schemas.microsoft.com/office/drawing/2016/11/main" r:id="rId3"/>
-              </a:ext>
-            </a:extLst>
-          </a:blip>
-          <a:srcRect l="20739" t="16194" r="27636" b="23011"/>
-          <a:stretch/>
-        </p:blipFill>
-        <p:spPr>
-          <a:xfrm>
-            <a:off x="2012797" y="5291699"/>
-            <a:ext cx="1459563" cy="1449852"/>
-          </a:xfrm>
-          <a:prstGeom prst="ellipse">
-            <a:avLst/>
-          </a:prstGeom>
-          <a:ln w="63500" cap="rnd">
-            <a:solidFill>
-              <a:srgbClr val="333333"/>
-            </a:solidFill>
-          </a:ln>
-          <a:effectLst/>
-          <a:scene3d>
-            <a:camera prst="orthographicFront"/>
-            <a:lightRig rig="contrasting" dir="t">
-              <a:rot lat="0" lon="0" rev="3000000"/>
-            </a:lightRig>
-          </a:scene3d>
-          <a:sp3d contourW="7620">
-            <a:bevelT w="95250" h="31750"/>
-            <a:contourClr>
-              <a:srgbClr val="333333"/>
-            </a:contourClr>
-          </a:sp3d>
-        </p:spPr>
-      </p:pic>
-      <p:pic>
-        <p:nvPicPr>
-          <p:cNvPr id="34" name="Picture 2" descr="Image result for energy burden">
-            <a:extLst>
-              <a:ext uri="{FF2B5EF4-FFF2-40B4-BE49-F238E27FC236}">
-                <a16:creationId xmlns:a16="http://schemas.microsoft.com/office/drawing/2014/main" id="{95660E83-A053-49E6-8F61-B4FA8AFF8937}"/>
-              </a:ext>
-            </a:extLst>
-          </p:cNvPr>
-          <p:cNvPicPr>
-            <a:picLocks noChangeAspect="1" noChangeArrowheads="1"/>
-          </p:cNvPicPr>
-          <p:nvPr/>
-        </p:nvPicPr>
-        <p:blipFill>
-          <a:blip r:embed="rId4">
-            <a:extLst>
-              <a:ext uri="{28A0092B-C50C-407E-A947-70E740481C1C}">
-                <a14:useLocalDpi xmlns:a14="http://schemas.microsoft.com/office/drawing/2010/main" val="0"/>
-              </a:ext>
-            </a:extLst>
-          </a:blip>
-          <a:srcRect/>
-          <a:stretch>
-            <a:fillRect/>
-          </a:stretch>
-        </p:blipFill>
-        <p:spPr bwMode="auto">
-          <a:xfrm>
-            <a:off x="1856226" y="3635762"/>
-            <a:ext cx="1489842" cy="1325218"/>
-          </a:xfrm>
-          <a:prstGeom prst="ellipse">
-            <a:avLst/>
-          </a:prstGeom>
-          <a:ln w="63500" cap="rnd">
-            <a:solidFill>
-              <a:srgbClr val="333333"/>
-            </a:solidFill>
-          </a:ln>
-          <a:effectLst/>
-          <a:scene3d>
-            <a:camera prst="orthographicFront"/>
-            <a:lightRig rig="contrasting" dir="t">
-              <a:rot lat="0" lon="0" rev="3000000"/>
-            </a:lightRig>
-          </a:scene3d>
-          <a:sp3d contourW="7620">
-            <a:bevelT w="95250" h="31750"/>
-            <a:contourClr>
-              <a:srgbClr val="333333"/>
-            </a:contourClr>
-          </a:sp3d>
-          <a:extLst>
-            <a:ext uri="{909E8E84-426E-40DD-AFC4-6F175D3DCCD1}">
-              <a14:hiddenFill xmlns:a14="http://schemas.microsoft.com/office/drawing/2010/main">
-                <a:solidFill>
-                  <a:srgbClr val="FFFFFF"/>
-                </a:solidFill>
-              </a14:hiddenFill>
-            </a:ext>
-          </a:extLst>
-        </p:spPr>
-      </p:pic>
-      <p:pic>
-        <p:nvPicPr>
-          <p:cNvPr id="35" name="Picture 34">
-            <a:extLst>
-              <a:ext uri="{FF2B5EF4-FFF2-40B4-BE49-F238E27FC236}">
-                <a16:creationId xmlns:a16="http://schemas.microsoft.com/office/drawing/2014/main" id="{348D4E80-E7B1-4062-8A90-FE7C39C60D2B}"/>
-              </a:ext>
-            </a:extLst>
-          </p:cNvPr>
-          <p:cNvPicPr>
-            <a:picLocks noChangeAspect="1"/>
-          </p:cNvPicPr>
-          <p:nvPr/>
-        </p:nvPicPr>
-        <p:blipFill>
-          <a:blip r:embed="rId5">
-            <a:extLst>
-              <a:ext uri="{837473B0-CC2E-450A-ABE3-18F120FF3D39}">
-                <a1611:picAttrSrcUrl xmlns:a1611="http://schemas.microsoft.com/office/drawing/2016/11/main" r:id="rId6"/>
-              </a:ext>
-            </a:extLst>
-          </a:blip>
-          <a:stretch>
-            <a:fillRect/>
-          </a:stretch>
-        </p:blipFill>
-        <p:spPr>
-          <a:xfrm>
-            <a:off x="1886613" y="1791999"/>
-            <a:ext cx="1459563" cy="1416339"/>
-          </a:xfrm>
-          <a:prstGeom prst="ellipse">
-            <a:avLst/>
-          </a:prstGeom>
-          <a:ln w="63500" cap="rnd">
-            <a:solidFill>
-              <a:srgbClr val="333333"/>
-            </a:solidFill>
-          </a:ln>
-          <a:effectLst/>
-          <a:scene3d>
-            <a:camera prst="orthographicFront"/>
-            <a:lightRig rig="contrasting" dir="t">
-              <a:rot lat="0" lon="0" rev="3000000"/>
-            </a:lightRig>
-          </a:scene3d>
-          <a:sp3d contourW="7620">
-            <a:bevelT w="95250" h="31750"/>
-            <a:contourClr>
-              <a:srgbClr val="333333"/>
-            </a:contourClr>
-          </a:sp3d>
-        </p:spPr>
-      </p:pic>
       <p:sp>
         <p:nvSpPr>
-          <p:cNvPr id="36" name="Content Placeholder 2">
+          <p:cNvPr id="5" name="TextBox 4">
             <a:extLst>
               <a:ext uri="{FF2B5EF4-FFF2-40B4-BE49-F238E27FC236}">
-                <a16:creationId xmlns:a16="http://schemas.microsoft.com/office/drawing/2014/main" id="{571B77CD-779F-4365-94B7-CC03B2EE9CA7}"/>
+                <a16:creationId xmlns:a16="http://schemas.microsoft.com/office/drawing/2014/main" id="{82C8BEC1-D2E1-4D7A-8C2E-6ED53B7BB518}"/>
               </a:ext>
             </a:extLst>
           </p:cNvPr>
-          <p:cNvSpPr txBox="1">
-            <a:spLocks/>
-          </p:cNvSpPr>
+          <p:cNvSpPr txBox="1"/>
           <p:nvPr/>
         </p:nvSpPr>
         <p:spPr>
           <a:xfrm>
-            <a:off x="209257" y="179081"/>
-            <a:ext cx="3924886" cy="1337628"/>
+            <a:off x="269876" y="2994442"/>
+            <a:ext cx="1394207" cy="646331"/>
           </a:xfrm>
           <a:prstGeom prst="rect">
             <a:avLst/>
           </a:prstGeom>
+          <a:noFill/>
+          <a:ln w="28575">
+            <a:solidFill>
+              <a:schemeClr val="tx1"/>
+            </a:solidFill>
+          </a:ln>
         </p:spPr>
         <p:txBody>
-          <a:bodyPr vert="horz" lIns="91440" tIns="45720" rIns="91440" bIns="45720" rtlCol="0">
-            <a:normAutofit lnSpcReduction="10000"/>
+          <a:bodyPr wrap="square" rtlCol="0">
+            <a:spAutoFit/>
           </a:bodyPr>
-          <a:lstStyle>
-            <a:lvl1pPr marL="228600" indent="-228600" algn="l" defTabSz="914400" rtl="0" eaLnBrk="1" latinLnBrk="0" hangingPunct="1">
-              <a:lnSpc>
-                <a:spcPct val="90000"/>
-              </a:lnSpc>
-              <a:spcBef>
-                <a:spcPts val="1000"/>
-              </a:spcBef>
-              <a:buFont typeface="Arial" panose="020B0604020202020204" pitchFamily="34" charset="0"/>
-              <a:buChar char="•"/>
-              <a:defRPr sz="2800" kern="1200">
-                <a:solidFill>
-                  <a:schemeClr val="tx1"/>
-                </a:solidFill>
-                <a:latin typeface="+mn-lt"/>
-                <a:ea typeface="+mn-ea"/>
-                <a:cs typeface="+mn-cs"/>
-              </a:defRPr>
-            </a:lvl1pPr>
-            <a:lvl2pPr marL="685800" indent="-228600" algn="l" defTabSz="914400" rtl="0" eaLnBrk="1" latinLnBrk="0" hangingPunct="1">
-              <a:lnSpc>
-                <a:spcPct val="90000"/>
-              </a:lnSpc>
-              <a:spcBef>
-                <a:spcPts val="500"/>
-              </a:spcBef>
-              <a:buFont typeface="Arial" panose="020B0604020202020204" pitchFamily="34" charset="0"/>
-              <a:buChar char="•"/>
-              <a:defRPr sz="2400" kern="1200">
-                <a:solidFill>
-                  <a:schemeClr val="tx1"/>
-                </a:solidFill>
-                <a:latin typeface="+mn-lt"/>
-                <a:ea typeface="+mn-ea"/>
-                <a:cs typeface="+mn-cs"/>
-              </a:defRPr>
-            </a:lvl2pPr>
-            <a:lvl3pPr marL="1143000" indent="-228600" algn="l" defTabSz="914400" rtl="0" eaLnBrk="1" latinLnBrk="0" hangingPunct="1">
-              <a:lnSpc>
-                <a:spcPct val="90000"/>
-              </a:lnSpc>
-              <a:spcBef>
-                <a:spcPts val="500"/>
-              </a:spcBef>
-              <a:buFont typeface="Arial" panose="020B0604020202020204" pitchFamily="34" charset="0"/>
-              <a:buChar char="•"/>
-              <a:defRPr sz="2000" kern="1200">
-                <a:solidFill>
-                  <a:schemeClr val="tx1"/>
-                </a:solidFill>
-                <a:latin typeface="+mn-lt"/>
-                <a:ea typeface="+mn-ea"/>
-                <a:cs typeface="+mn-cs"/>
-              </a:defRPr>
-            </a:lvl3pPr>
-            <a:lvl4pPr marL="1600200" indent="-228600" algn="l" defTabSz="914400" rtl="0" eaLnBrk="1" latinLnBrk="0" hangingPunct="1">
-              <a:lnSpc>
-                <a:spcPct val="90000"/>
-              </a:lnSpc>
-              <a:spcBef>
-                <a:spcPts val="500"/>
-              </a:spcBef>
-              <a:buFont typeface="Arial" panose="020B0604020202020204" pitchFamily="34" charset="0"/>
-              <a:buChar char="•"/>
-              <a:defRPr sz="1800" kern="1200">
-                <a:solidFill>
-                  <a:schemeClr val="tx1"/>
-                </a:solidFill>
-                <a:latin typeface="+mn-lt"/>
-                <a:ea typeface="+mn-ea"/>
-                <a:cs typeface="+mn-cs"/>
-              </a:defRPr>
-            </a:lvl4pPr>
-            <a:lvl5pPr marL="2057400" indent="-228600" algn="l" defTabSz="914400" rtl="0" eaLnBrk="1" latinLnBrk="0" hangingPunct="1">
-              <a:lnSpc>
-                <a:spcPct val="90000"/>
-              </a:lnSpc>
-              <a:spcBef>
-                <a:spcPts val="500"/>
-              </a:spcBef>
-              <a:buFont typeface="Arial" panose="020B0604020202020204" pitchFamily="34" charset="0"/>
-              <a:buChar char="•"/>
-              <a:defRPr sz="1800" kern="1200">
-                <a:solidFill>
-                  <a:schemeClr val="tx1"/>
-                </a:solidFill>
-                <a:latin typeface="+mn-lt"/>
-                <a:ea typeface="+mn-ea"/>
-                <a:cs typeface="+mn-cs"/>
-              </a:defRPr>
-            </a:lvl5pPr>
-            <a:lvl6pPr marL="2514600" indent="-228600" algn="l" defTabSz="914400" rtl="0" eaLnBrk="1" latinLnBrk="0" hangingPunct="1">
-              <a:lnSpc>
-                <a:spcPct val="90000"/>
-              </a:lnSpc>
-              <a:spcBef>
-                <a:spcPts val="500"/>
-              </a:spcBef>
-              <a:buFont typeface="Arial" panose="020B0604020202020204" pitchFamily="34" charset="0"/>
-              <a:buChar char="•"/>
-              <a:defRPr sz="1800" kern="1200">
-                <a:solidFill>
-                  <a:schemeClr val="tx1"/>
-                </a:solidFill>
-                <a:latin typeface="+mn-lt"/>
-                <a:ea typeface="+mn-ea"/>
-                <a:cs typeface="+mn-cs"/>
-              </a:defRPr>
-            </a:lvl6pPr>
-            <a:lvl7pPr marL="2971800" indent="-228600" algn="l" defTabSz="914400" rtl="0" eaLnBrk="1" latinLnBrk="0" hangingPunct="1">
-              <a:lnSpc>
-                <a:spcPct val="90000"/>
-              </a:lnSpc>
-              <a:spcBef>
-                <a:spcPts val="500"/>
-              </a:spcBef>
-              <a:buFont typeface="Arial" panose="020B0604020202020204" pitchFamily="34" charset="0"/>
-              <a:buChar char="•"/>
-              <a:defRPr sz="1800" kern="1200">
-                <a:solidFill>
-                  <a:schemeClr val="tx1"/>
-                </a:solidFill>
-                <a:latin typeface="+mn-lt"/>
-                <a:ea typeface="+mn-ea"/>
-                <a:cs typeface="+mn-cs"/>
-              </a:defRPr>
-            </a:lvl7pPr>
-            <a:lvl8pPr marL="3429000" indent="-228600" algn="l" defTabSz="914400" rtl="0" eaLnBrk="1" latinLnBrk="0" hangingPunct="1">
-              <a:lnSpc>
-                <a:spcPct val="90000"/>
-              </a:lnSpc>
-              <a:spcBef>
-                <a:spcPts val="500"/>
-              </a:spcBef>
-              <a:buFont typeface="Arial" panose="020B0604020202020204" pitchFamily="34" charset="0"/>
-              <a:buChar char="•"/>
-              <a:defRPr sz="1800" kern="1200">
-                <a:solidFill>
-                  <a:schemeClr val="tx1"/>
-                </a:solidFill>
-                <a:latin typeface="+mn-lt"/>
-                <a:ea typeface="+mn-ea"/>
-                <a:cs typeface="+mn-cs"/>
-              </a:defRPr>
-            </a:lvl8pPr>
-            <a:lvl9pPr marL="3886200" indent="-228600" algn="l" defTabSz="914400" rtl="0" eaLnBrk="1" latinLnBrk="0" hangingPunct="1">
-              <a:lnSpc>
-                <a:spcPct val="90000"/>
-              </a:lnSpc>
-              <a:spcBef>
-                <a:spcPts val="500"/>
-              </a:spcBef>
-              <a:buFont typeface="Arial" panose="020B0604020202020204" pitchFamily="34" charset="0"/>
-              <a:buChar char="•"/>
-              <a:defRPr sz="1800" kern="1200">
-                <a:solidFill>
-                  <a:schemeClr val="tx1"/>
-                </a:solidFill>
-                <a:latin typeface="+mn-lt"/>
-                <a:ea typeface="+mn-ea"/>
-                <a:cs typeface="+mn-cs"/>
-              </a:defRPr>
-            </a:lvl9pPr>
-          </a:lstStyle>
+          <a:lstStyle/>
           <a:p>
-            <a:pPr marL="0" indent="0">
-              <a:buNone/>
-            </a:pPr>
-            <a:endParaRPr lang="en-US" dirty="0"/>
-          </a:p>
-          <a:p>
-            <a:pPr marL="0" indent="0">
-              <a:buNone/>
-            </a:pPr>
             <a:r>
-              <a:rPr lang="en-US" dirty="0"/>
-              <a:t>Variables are named with sources</a:t>
+              <a:rPr lang="en-US" dirty="0">
+                <a:ln w="0"/>
+                <a:effectLst>
+                  <a:outerShdw blurRad="38100" dist="19050" dir="2700000" algn="tl" rotWithShape="0">
+                    <a:schemeClr val="dk1">
+                      <a:alpha val="40000"/>
+                    </a:schemeClr>
+                  </a:outerShdw>
+                </a:effectLst>
+              </a:rPr>
+              <a:t>Dependent Variables</a:t>
             </a:r>
-          </a:p>
-          <a:p>
-            <a:pPr marL="0" indent="0">
-              <a:buNone/>
-            </a:pPr>
-            <a:endParaRPr lang="en-US" dirty="0"/>
           </a:p>
         </p:txBody>
       </p:sp>
+      <p:grpSp>
+        <p:nvGrpSpPr>
+          <p:cNvPr id="10" name="Group 9">
+            <a:extLst>
+              <a:ext uri="{FF2B5EF4-FFF2-40B4-BE49-F238E27FC236}">
+                <a16:creationId xmlns:a16="http://schemas.microsoft.com/office/drawing/2014/main" id="{506FB661-FE6A-4424-A78F-42A6070E9FDC}"/>
+              </a:ext>
+            </a:extLst>
+          </p:cNvPr>
+          <p:cNvGrpSpPr/>
+          <p:nvPr/>
+        </p:nvGrpSpPr>
+        <p:grpSpPr>
+          <a:xfrm>
+            <a:off x="1769253" y="1665779"/>
+            <a:ext cx="2888767" cy="4915240"/>
+            <a:chOff x="2427468" y="1698286"/>
+            <a:chExt cx="2888767" cy="4915240"/>
+          </a:xfrm>
+        </p:grpSpPr>
+        <p:pic>
+          <p:nvPicPr>
+            <p:cNvPr id="33" name="Picture 32">
+              <a:extLst>
+                <a:ext uri="{FF2B5EF4-FFF2-40B4-BE49-F238E27FC236}">
+                  <a16:creationId xmlns:a16="http://schemas.microsoft.com/office/drawing/2014/main" id="{57878C3A-5C08-4390-BE03-A8905BB16348}"/>
+                </a:ext>
+              </a:extLst>
+            </p:cNvPr>
+            <p:cNvPicPr>
+              <a:picLocks noChangeAspect="1"/>
+            </p:cNvPicPr>
+            <p:nvPr/>
+          </p:nvPicPr>
+          <p:blipFill rotWithShape="1">
+            <a:blip r:embed="rId2">
+              <a:extLst>
+                <a:ext uri="{837473B0-CC2E-450A-ABE3-18F120FF3D39}">
+                  <a1611:picAttrSrcUrl xmlns:a1611="http://schemas.microsoft.com/office/drawing/2016/11/main" r:id="rId3"/>
+                </a:ext>
+              </a:extLst>
+            </a:blip>
+            <a:srcRect l="20739" t="16194" r="27636" b="23011"/>
+            <a:stretch/>
+          </p:blipFill>
+          <p:spPr>
+            <a:xfrm>
+              <a:off x="2454714" y="5163674"/>
+              <a:ext cx="1459563" cy="1449852"/>
+            </a:xfrm>
+            <a:prstGeom prst="ellipse">
+              <a:avLst/>
+            </a:prstGeom>
+            <a:ln w="63500" cap="rnd">
+              <a:solidFill>
+                <a:srgbClr val="333333"/>
+              </a:solidFill>
+            </a:ln>
+            <a:effectLst/>
+            <a:scene3d>
+              <a:camera prst="orthographicFront"/>
+              <a:lightRig rig="contrasting" dir="t">
+                <a:rot lat="0" lon="0" rev="3000000"/>
+              </a:lightRig>
+            </a:scene3d>
+            <a:sp3d contourW="7620">
+              <a:bevelT w="95250" h="31750"/>
+              <a:contourClr>
+                <a:srgbClr val="333333"/>
+              </a:contourClr>
+            </a:sp3d>
+          </p:spPr>
+        </p:pic>
+        <p:pic>
+          <p:nvPicPr>
+            <p:cNvPr id="34" name="Picture 2" descr="Image result for energy burden">
+              <a:extLst>
+                <a:ext uri="{FF2B5EF4-FFF2-40B4-BE49-F238E27FC236}">
+                  <a16:creationId xmlns:a16="http://schemas.microsoft.com/office/drawing/2014/main" id="{95660E83-A053-49E6-8F61-B4FA8AFF8937}"/>
+                </a:ext>
+              </a:extLst>
+            </p:cNvPr>
+            <p:cNvPicPr>
+              <a:picLocks noChangeAspect="1" noChangeArrowheads="1"/>
+            </p:cNvPicPr>
+            <p:nvPr/>
+          </p:nvPicPr>
+          <p:blipFill>
+            <a:blip r:embed="rId4">
+              <a:extLst>
+                <a:ext uri="{28A0092B-C50C-407E-A947-70E740481C1C}">
+                  <a14:useLocalDpi xmlns:a14="http://schemas.microsoft.com/office/drawing/2010/main" val="0"/>
+                </a:ext>
+              </a:extLst>
+            </a:blip>
+            <a:srcRect/>
+            <a:stretch>
+              <a:fillRect/>
+            </a:stretch>
+          </p:blipFill>
+          <p:spPr bwMode="auto">
+            <a:xfrm>
+              <a:off x="2427468" y="3459384"/>
+              <a:ext cx="1489842" cy="1325218"/>
+            </a:xfrm>
+            <a:prstGeom prst="ellipse">
+              <a:avLst/>
+            </a:prstGeom>
+            <a:ln w="63500" cap="rnd">
+              <a:solidFill>
+                <a:srgbClr val="333333"/>
+              </a:solidFill>
+            </a:ln>
+            <a:effectLst/>
+            <a:scene3d>
+              <a:camera prst="orthographicFront"/>
+              <a:lightRig rig="contrasting" dir="t">
+                <a:rot lat="0" lon="0" rev="3000000"/>
+              </a:lightRig>
+            </a:scene3d>
+            <a:sp3d contourW="7620">
+              <a:bevelT w="95250" h="31750"/>
+              <a:contourClr>
+                <a:srgbClr val="333333"/>
+              </a:contourClr>
+            </a:sp3d>
+            <a:extLst>
+              <a:ext uri="{909E8E84-426E-40DD-AFC4-6F175D3DCCD1}">
+                <a14:hiddenFill xmlns:a14="http://schemas.microsoft.com/office/drawing/2010/main">
+                  <a:solidFill>
+                    <a:srgbClr val="FFFFFF"/>
+                  </a:solidFill>
+                </a14:hiddenFill>
+              </a:ext>
+            </a:extLst>
+          </p:spPr>
+        </p:pic>
+        <p:pic>
+          <p:nvPicPr>
+            <p:cNvPr id="35" name="Picture 34">
+              <a:extLst>
+                <a:ext uri="{FF2B5EF4-FFF2-40B4-BE49-F238E27FC236}">
+                  <a16:creationId xmlns:a16="http://schemas.microsoft.com/office/drawing/2014/main" id="{348D4E80-E7B1-4062-8A90-FE7C39C60D2B}"/>
+                </a:ext>
+              </a:extLst>
+            </p:cNvPr>
+            <p:cNvPicPr>
+              <a:picLocks noChangeAspect="1"/>
+            </p:cNvPicPr>
+            <p:nvPr/>
+          </p:nvPicPr>
+          <p:blipFill>
+            <a:blip r:embed="rId5">
+              <a:extLst>
+                <a:ext uri="{837473B0-CC2E-450A-ABE3-18F120FF3D39}">
+                  <a1611:picAttrSrcUrl xmlns:a1611="http://schemas.microsoft.com/office/drawing/2016/11/main" r:id="rId6"/>
+                </a:ext>
+              </a:extLst>
+            </a:blip>
+            <a:stretch>
+              <a:fillRect/>
+            </a:stretch>
+          </p:blipFill>
+          <p:spPr>
+            <a:xfrm>
+              <a:off x="2584126" y="1698286"/>
+              <a:ext cx="1459563" cy="1416339"/>
+            </a:xfrm>
+            <a:prstGeom prst="ellipse">
+              <a:avLst/>
+            </a:prstGeom>
+            <a:ln w="63500" cap="rnd">
+              <a:solidFill>
+                <a:srgbClr val="333333"/>
+              </a:solidFill>
+            </a:ln>
+            <a:effectLst/>
+            <a:scene3d>
+              <a:camera prst="orthographicFront"/>
+              <a:lightRig rig="contrasting" dir="t">
+                <a:rot lat="0" lon="0" rev="3000000"/>
+              </a:lightRig>
+            </a:scene3d>
+            <a:sp3d contourW="7620">
+              <a:bevelT w="95250" h="31750"/>
+              <a:contourClr>
+                <a:srgbClr val="333333"/>
+              </a:contourClr>
+            </a:sp3d>
+          </p:spPr>
+        </p:pic>
+        <p:sp>
+          <p:nvSpPr>
+            <p:cNvPr id="6" name="Left Brace 5">
+              <a:extLst>
+                <a:ext uri="{FF2B5EF4-FFF2-40B4-BE49-F238E27FC236}">
+                  <a16:creationId xmlns:a16="http://schemas.microsoft.com/office/drawing/2014/main" id="{751EF83A-6778-42EA-9A80-6BE52AE1005B}"/>
+                </a:ext>
+              </a:extLst>
+            </p:cNvPr>
+            <p:cNvSpPr/>
+            <p:nvPr/>
+          </p:nvSpPr>
+          <p:spPr>
+            <a:xfrm>
+              <a:off x="3929368" y="1769351"/>
+              <a:ext cx="1386867" cy="4814092"/>
+            </a:xfrm>
+            <a:prstGeom prst="leftBrace">
+              <a:avLst>
+                <a:gd name="adj1" fmla="val 8333"/>
+                <a:gd name="adj2" fmla="val 44399"/>
+              </a:avLst>
+            </a:prstGeom>
+            <a:ln w="38100"/>
+          </p:spPr>
+          <p:style>
+            <a:lnRef idx="1">
+              <a:schemeClr val="dk1"/>
+            </a:lnRef>
+            <a:fillRef idx="0">
+              <a:schemeClr val="dk1"/>
+            </a:fillRef>
+            <a:effectRef idx="0">
+              <a:schemeClr val="dk1"/>
+            </a:effectRef>
+            <a:fontRef idx="minor">
+              <a:schemeClr val="tx1"/>
+            </a:fontRef>
+          </p:style>
+          <p:txBody>
+            <a:bodyPr rtlCol="0" anchor="ctr"/>
+            <a:lstStyle/>
+            <a:p>
+              <a:pPr algn="ctr"/>
+              <a:endParaRPr lang="en-US"/>
+            </a:p>
+          </p:txBody>
+        </p:sp>
+      </p:grpSp>
+      <p:grpSp>
+        <p:nvGrpSpPr>
+          <p:cNvPr id="8" name="Group 7">
+            <a:extLst>
+              <a:ext uri="{FF2B5EF4-FFF2-40B4-BE49-F238E27FC236}">
+                <a16:creationId xmlns:a16="http://schemas.microsoft.com/office/drawing/2014/main" id="{910E8003-A91A-42E5-AE90-63EB2717E2E2}"/>
+              </a:ext>
+            </a:extLst>
+          </p:cNvPr>
+          <p:cNvGrpSpPr/>
+          <p:nvPr/>
+        </p:nvGrpSpPr>
+        <p:grpSpPr>
+          <a:xfrm>
+            <a:off x="10890790" y="1070152"/>
+            <a:ext cx="1156831" cy="595627"/>
+            <a:chOff x="8499072" y="1048812"/>
+            <a:chExt cx="1156831" cy="595627"/>
+          </a:xfrm>
+        </p:grpSpPr>
+        <p:sp>
+          <p:nvSpPr>
+            <p:cNvPr id="37" name="Left Brace 36">
+              <a:extLst>
+                <a:ext uri="{FF2B5EF4-FFF2-40B4-BE49-F238E27FC236}">
+                  <a16:creationId xmlns:a16="http://schemas.microsoft.com/office/drawing/2014/main" id="{25EDFE33-AD04-4311-B422-80821E589397}"/>
+                </a:ext>
+              </a:extLst>
+            </p:cNvPr>
+            <p:cNvSpPr/>
+            <p:nvPr/>
+          </p:nvSpPr>
+          <p:spPr>
+            <a:xfrm rot="10800000">
+              <a:off x="8499072" y="1048812"/>
+              <a:ext cx="421974" cy="595627"/>
+            </a:xfrm>
+            <a:prstGeom prst="leftBrace">
+              <a:avLst>
+                <a:gd name="adj1" fmla="val 8333"/>
+                <a:gd name="adj2" fmla="val 44399"/>
+              </a:avLst>
+            </a:prstGeom>
+            <a:ln w="28575"/>
+          </p:spPr>
+          <p:style>
+            <a:lnRef idx="1">
+              <a:schemeClr val="dk1"/>
+            </a:lnRef>
+            <a:fillRef idx="0">
+              <a:schemeClr val="dk1"/>
+            </a:fillRef>
+            <a:effectRef idx="0">
+              <a:schemeClr val="dk1"/>
+            </a:effectRef>
+            <a:fontRef idx="minor">
+              <a:schemeClr val="tx1"/>
+            </a:fontRef>
+          </p:style>
+          <p:txBody>
+            <a:bodyPr rtlCol="0" anchor="ctr"/>
+            <a:lstStyle/>
+            <a:p>
+              <a:pPr algn="ctr"/>
+              <a:endParaRPr lang="en-US"/>
+            </a:p>
+          </p:txBody>
+        </p:sp>
+        <p:sp>
+          <p:nvSpPr>
+            <p:cNvPr id="38" name="TextBox 37">
+              <a:extLst>
+                <a:ext uri="{FF2B5EF4-FFF2-40B4-BE49-F238E27FC236}">
+                  <a16:creationId xmlns:a16="http://schemas.microsoft.com/office/drawing/2014/main" id="{10D7B1B0-09D4-464D-8E96-7B53DD49A151}"/>
+                </a:ext>
+              </a:extLst>
+            </p:cNvPr>
+            <p:cNvSpPr txBox="1"/>
+            <p:nvPr/>
+          </p:nvSpPr>
+          <p:spPr>
+            <a:xfrm>
+              <a:off x="9031938" y="1147376"/>
+              <a:ext cx="623965" cy="369332"/>
+            </a:xfrm>
+            <a:prstGeom prst="rect">
+              <a:avLst/>
+            </a:prstGeom>
+            <a:noFill/>
+            <a:ln w="28575">
+              <a:solidFill>
+                <a:schemeClr val="tx1"/>
+              </a:solidFill>
+            </a:ln>
+          </p:spPr>
+          <p:txBody>
+            <a:bodyPr wrap="square" rtlCol="0">
+              <a:spAutoFit/>
+            </a:bodyPr>
+            <a:lstStyle/>
+            <a:p>
+              <a:r>
+                <a:rPr lang="en-US" dirty="0">
+                  <a:ln w="0"/>
+                  <a:effectLst>
+                    <a:outerShdw blurRad="38100" dist="19050" dir="2700000" algn="tl" rotWithShape="0">
+                      <a:schemeClr val="dk1">
+                        <a:alpha val="40000"/>
+                      </a:schemeClr>
+                    </a:outerShdw>
+                  </a:effectLst>
+                </a:rPr>
+                <a:t>Key</a:t>
+              </a:r>
+            </a:p>
+          </p:txBody>
+        </p:sp>
+      </p:grpSp>
+      <p:grpSp>
+        <p:nvGrpSpPr>
+          <p:cNvPr id="7" name="Group 6">
+            <a:extLst>
+              <a:ext uri="{FF2B5EF4-FFF2-40B4-BE49-F238E27FC236}">
+                <a16:creationId xmlns:a16="http://schemas.microsoft.com/office/drawing/2014/main" id="{034FF037-3ECC-40E0-BB4B-59F2621C48A5}"/>
+              </a:ext>
+            </a:extLst>
+          </p:cNvPr>
+          <p:cNvGrpSpPr/>
+          <p:nvPr/>
+        </p:nvGrpSpPr>
+        <p:grpSpPr>
+          <a:xfrm>
+            <a:off x="2309931" y="542813"/>
+            <a:ext cx="2283500" cy="646331"/>
+            <a:chOff x="1141666" y="531542"/>
+            <a:chExt cx="2283500" cy="646331"/>
+          </a:xfrm>
+        </p:grpSpPr>
+        <p:sp>
+          <p:nvSpPr>
+            <p:cNvPr id="39" name="Left Brace 38">
+              <a:extLst>
+                <a:ext uri="{FF2B5EF4-FFF2-40B4-BE49-F238E27FC236}">
+                  <a16:creationId xmlns:a16="http://schemas.microsoft.com/office/drawing/2014/main" id="{60804222-6500-4785-AA85-1B14F275EC5C}"/>
+                </a:ext>
+              </a:extLst>
+            </p:cNvPr>
+            <p:cNvSpPr/>
+            <p:nvPr/>
+          </p:nvSpPr>
+          <p:spPr>
+            <a:xfrm>
+              <a:off x="3003192" y="667065"/>
+              <a:ext cx="421974" cy="341575"/>
+            </a:xfrm>
+            <a:prstGeom prst="leftBrace">
+              <a:avLst>
+                <a:gd name="adj1" fmla="val 8333"/>
+                <a:gd name="adj2" fmla="val 52733"/>
+              </a:avLst>
+            </a:prstGeom>
+            <a:ln w="28575"/>
+          </p:spPr>
+          <p:style>
+            <a:lnRef idx="1">
+              <a:schemeClr val="dk1"/>
+            </a:lnRef>
+            <a:fillRef idx="0">
+              <a:schemeClr val="dk1"/>
+            </a:fillRef>
+            <a:effectRef idx="0">
+              <a:schemeClr val="dk1"/>
+            </a:effectRef>
+            <a:fontRef idx="minor">
+              <a:schemeClr val="tx1"/>
+            </a:fontRef>
+          </p:style>
+          <p:txBody>
+            <a:bodyPr rtlCol="0" anchor="ctr"/>
+            <a:lstStyle/>
+            <a:p>
+              <a:pPr algn="ctr"/>
+              <a:endParaRPr lang="en-US"/>
+            </a:p>
+          </p:txBody>
+        </p:sp>
+        <p:sp>
+          <p:nvSpPr>
+            <p:cNvPr id="40" name="TextBox 39">
+              <a:extLst>
+                <a:ext uri="{FF2B5EF4-FFF2-40B4-BE49-F238E27FC236}">
+                  <a16:creationId xmlns:a16="http://schemas.microsoft.com/office/drawing/2014/main" id="{3AA6EBD4-4A85-4284-9992-A786B03B3EA5}"/>
+                </a:ext>
+              </a:extLst>
+            </p:cNvPr>
+            <p:cNvSpPr txBox="1"/>
+            <p:nvPr/>
+          </p:nvSpPr>
+          <p:spPr>
+            <a:xfrm>
+              <a:off x="1141666" y="531542"/>
+              <a:ext cx="1811183" cy="646331"/>
+            </a:xfrm>
+            <a:prstGeom prst="rect">
+              <a:avLst/>
+            </a:prstGeom>
+            <a:noFill/>
+            <a:ln w="28575">
+              <a:solidFill>
+                <a:schemeClr val="tx1"/>
+              </a:solidFill>
+            </a:ln>
+          </p:spPr>
+          <p:txBody>
+            <a:bodyPr wrap="square" rtlCol="0">
+              <a:spAutoFit/>
+            </a:bodyPr>
+            <a:lstStyle/>
+            <a:p>
+              <a:r>
+                <a:rPr lang="en-US" dirty="0">
+                  <a:ln w="0"/>
+                  <a:effectLst>
+                    <a:outerShdw blurRad="38100" dist="19050" dir="2700000" algn="tl" rotWithShape="0">
+                      <a:schemeClr val="dk1">
+                        <a:alpha val="40000"/>
+                      </a:schemeClr>
+                    </a:outerShdw>
+                  </a:effectLst>
+                </a:rPr>
+                <a:t>Independent Variable</a:t>
+              </a:r>
+            </a:p>
+          </p:txBody>
+        </p:sp>
+      </p:grpSp>
     </p:spTree>
     <p:extLst>
       <p:ext uri="{BB962C8B-B14F-4D97-AF65-F5344CB8AC3E}">
@@ -32689,8 +33373,8 @@
         </p:nvSpPr>
         <p:spPr>
           <a:xfrm>
-            <a:off x="8547148" y="2894593"/>
-            <a:ext cx="3412810" cy="742692"/>
+            <a:off x="9643952" y="1639395"/>
+            <a:ext cx="2354899" cy="2055260"/>
           </a:xfrm>
         </p:spPr>
         <p:txBody>
@@ -32703,10 +33387,10 @@
             <a:r>
               <a:rPr lang="en-US" sz="3200" dirty="0">
                 <a:solidFill>
-                  <a:schemeClr val="accent1"/>
+                  <a:schemeClr val="tx1"/>
                 </a:solidFill>
               </a:rPr>
-              <a:t>Validation</a:t>
+              <a:t>Validation through different data sources</a:t>
             </a:r>
           </a:p>
         </p:txBody>
@@ -32825,14 +33509,14 @@
           <p:nvPr>
             <p:extLst>
               <p:ext uri="{D42A27DB-BD31-4B8C-83A1-F6EECF244321}">
-                <p14:modId xmlns:p14="http://schemas.microsoft.com/office/powerpoint/2010/main" val="3478636025"/>
+                <p14:modId xmlns:p14="http://schemas.microsoft.com/office/powerpoint/2010/main" val="2893972332"/>
               </p:ext>
             </p:extLst>
           </p:nvPr>
         </p:nvGraphicFramePr>
         <p:xfrm>
-          <a:off x="975251" y="491530"/>
-          <a:ext cx="7531621" cy="6291510"/>
+          <a:off x="1393830" y="87966"/>
+          <a:ext cx="8226946" cy="6566414"/>
         </p:xfrm>
         <a:graphic>
           <a:graphicData uri="http://schemas.openxmlformats.org/drawingml/2006/table">
@@ -32841,21 +33525,21 @@
                 <a:tableStyleId>{5C22544A-7EE6-4342-B048-85BDC9FD1C3A}</a:tableStyleId>
               </a:tblPr>
               <a:tblGrid>
-                <a:gridCol w="2677102">
+                <a:gridCol w="2718086">
                   <a:extLst>
                     <a:ext uri="{9D8B030D-6E8A-4147-A177-3AD203B41FA5}">
                       <a16:colId xmlns:a16="http://schemas.microsoft.com/office/drawing/2014/main" val="3099312768"/>
                     </a:ext>
                   </a:extLst>
                 </a:gridCol>
-                <a:gridCol w="2343978">
+                <a:gridCol w="2766544">
                   <a:extLst>
                     <a:ext uri="{9D8B030D-6E8A-4147-A177-3AD203B41FA5}">
-                      <a16:colId xmlns:a16="http://schemas.microsoft.com/office/drawing/2014/main" val="462369711"/>
+                      <a16:colId xmlns:a16="http://schemas.microsoft.com/office/drawing/2014/main" val="394363850"/>
                     </a:ext>
                   </a:extLst>
                 </a:gridCol>
-                <a:gridCol w="2510541">
+                <a:gridCol w="2742316">
                   <a:extLst>
                     <a:ext uri="{9D8B030D-6E8A-4147-A177-3AD203B41FA5}">
                       <a16:colId xmlns:a16="http://schemas.microsoft.com/office/drawing/2014/main" val="3995369174"/>
@@ -32910,20 +33594,14 @@
                         </a:spcAft>
                       </a:pPr>
                       <a:r>
-                        <a:rPr lang="en-US" sz="1800">
+                        <a:rPr lang="en-US" sz="1800" dirty="0">
                           <a:effectLst/>
                           <a:latin typeface="Calibri" panose="020F0502020204030204" pitchFamily="34" charset="0"/>
                           <a:ea typeface="Calibri" panose="020F0502020204030204" pitchFamily="34" charset="0"/>
                           <a:cs typeface="Times New Roman" panose="02020603050405020304" pitchFamily="18" charset="0"/>
                         </a:rPr>
-                        <a:t>Validation Source</a:t>
+                        <a:t>Analysis Source</a:t>
                       </a:r>
-                      <a:endParaRPr lang="en-US" sz="1800" dirty="0">
-                        <a:effectLst/>
-                        <a:latin typeface="Calibri" panose="020F0502020204030204" pitchFamily="34" charset="0"/>
-                        <a:ea typeface="Calibri" panose="020F0502020204030204" pitchFamily="34" charset="0"/>
-                        <a:cs typeface="Times New Roman" panose="02020603050405020304" pitchFamily="18" charset="0"/>
-                      </a:endParaRPr>
                     </a:p>
                   </a:txBody>
                   <a:tcPr marL="86320" marR="86320" marT="0" marB="0"/>
@@ -32951,7 +33629,7 @@
                           <a:ea typeface="Calibri" panose="020F0502020204030204" pitchFamily="34" charset="0"/>
                           <a:cs typeface="Times New Roman" panose="02020603050405020304" pitchFamily="18" charset="0"/>
                         </a:rPr>
-                        <a:t>Analysis Variable Source</a:t>
+                        <a:t>Validation Source</a:t>
                       </a:r>
                     </a:p>
                   </a:txBody>
@@ -33009,6 +33687,15 @@
                           <a:spcPts val="0"/>
                         </a:spcAft>
                       </a:pPr>
+                      <a:r>
+                        <a:rPr lang="en-US" sz="1400">
+                          <a:effectLst/>
+                          <a:latin typeface="Calibri" panose="020F0502020204030204" pitchFamily="34" charset="0"/>
+                          <a:ea typeface="Calibri" panose="020F0502020204030204" pitchFamily="34" charset="0"/>
+                          <a:cs typeface="Times New Roman" panose="02020603050405020304" pitchFamily="18" charset="0"/>
+                        </a:rPr>
+                        <a:t>National Renewable Energy Lab</a:t>
+                      </a:r>
                       <a:endParaRPr lang="en-US" sz="1400" dirty="0">
                         <a:effectLst/>
                         <a:latin typeface="Calibri" panose="020F0502020204030204" pitchFamily="34" charset="0"/>
@@ -33035,12 +33722,15 @@
                           <a:spcPts val="0"/>
                         </a:spcAft>
                       </a:pPr>
-                      <a:endParaRPr lang="en-US" sz="1400" dirty="0">
-                        <a:effectLst/>
-                        <a:latin typeface="Calibri" panose="020F0502020204030204" pitchFamily="34" charset="0"/>
-                        <a:ea typeface="Calibri" panose="020F0502020204030204" pitchFamily="34" charset="0"/>
-                        <a:cs typeface="Times New Roman" panose="02020603050405020304" pitchFamily="18" charset="0"/>
-                      </a:endParaRPr>
+                      <a:r>
+                        <a:rPr lang="en-US" sz="1400" dirty="0">
+                          <a:effectLst/>
+                          <a:latin typeface="Calibri" panose="020F0502020204030204" pitchFamily="34" charset="0"/>
+                          <a:ea typeface="Calibri" panose="020F0502020204030204" pitchFamily="34" charset="0"/>
+                          <a:cs typeface="Times New Roman" panose="02020603050405020304" pitchFamily="18" charset="0"/>
+                        </a:rPr>
+                        <a:t>SAME</a:t>
+                      </a:r>
                     </a:p>
                   </a:txBody>
                   <a:tcPr marL="86320" marR="86320" marT="0" marB="0"/>
@@ -33075,7 +33765,7 @@
                           <a:ea typeface="Calibri" panose="020F0502020204030204" pitchFamily="34" charset="0"/>
                           <a:cs typeface="Times New Roman" panose="02020603050405020304" pitchFamily="18" charset="0"/>
                         </a:rPr>
-                        <a:t>Federal Identification</a:t>
+                        <a:t>FIP</a:t>
                       </a:r>
                     </a:p>
                   </a:txBody>
@@ -33097,6 +33787,15 @@
                           <a:spcPts val="0"/>
                         </a:spcAft>
                       </a:pPr>
+                      <a:r>
+                        <a:rPr lang="en-US" sz="1400">
+                          <a:effectLst/>
+                          <a:latin typeface="Calibri" panose="020F0502020204030204" pitchFamily="34" charset="0"/>
+                          <a:ea typeface="Calibri" panose="020F0502020204030204" pitchFamily="34" charset="0"/>
+                          <a:cs typeface="Times New Roman" panose="02020603050405020304" pitchFamily="18" charset="0"/>
+                        </a:rPr>
+                        <a:t>National Renewable Energy Lab</a:t>
+                      </a:r>
                       <a:endParaRPr lang="en-US" sz="1400" dirty="0">
                         <a:effectLst/>
                         <a:latin typeface="Calibri" panose="020F0502020204030204" pitchFamily="34" charset="0"/>
@@ -33123,12 +33822,15 @@
                           <a:spcPts val="0"/>
                         </a:spcAft>
                       </a:pPr>
-                      <a:endParaRPr lang="en-US" sz="1400" dirty="0">
-                        <a:effectLst/>
-                        <a:latin typeface="Calibri" panose="020F0502020204030204" pitchFamily="34" charset="0"/>
-                        <a:ea typeface="Calibri" panose="020F0502020204030204" pitchFamily="34" charset="0"/>
-                        <a:cs typeface="Times New Roman" panose="02020603050405020304" pitchFamily="18" charset="0"/>
-                      </a:endParaRPr>
+                      <a:r>
+                        <a:rPr lang="en-US" sz="1400" dirty="0">
+                          <a:effectLst/>
+                          <a:latin typeface="Calibri" panose="020F0502020204030204" pitchFamily="34" charset="0"/>
+                          <a:ea typeface="Calibri" panose="020F0502020204030204" pitchFamily="34" charset="0"/>
+                          <a:cs typeface="Times New Roman" panose="02020603050405020304" pitchFamily="18" charset="0"/>
+                        </a:rPr>
+                        <a:t>SAME</a:t>
+                      </a:r>
                     </a:p>
                   </a:txBody>
                   <a:tcPr marL="86320" marR="86320" marT="0" marB="0"/>
@@ -33185,12 +33887,15 @@
                           <a:spcPts val="0"/>
                         </a:spcAft>
                       </a:pPr>
-                      <a:endParaRPr lang="en-US" sz="1400" dirty="0">
-                        <a:effectLst/>
-                        <a:latin typeface="Calibri" panose="020F0502020204030204" pitchFamily="34" charset="0"/>
-                        <a:ea typeface="Calibri" panose="020F0502020204030204" pitchFamily="34" charset="0"/>
-                        <a:cs typeface="Times New Roman" panose="02020603050405020304" pitchFamily="18" charset="0"/>
-                      </a:endParaRPr>
+                      <a:r>
+                        <a:rPr lang="en-US" sz="1400" dirty="0">
+                          <a:effectLst/>
+                          <a:latin typeface="Calibri" panose="020F0502020204030204" pitchFamily="34" charset="0"/>
+                          <a:ea typeface="Calibri" panose="020F0502020204030204" pitchFamily="34" charset="0"/>
+                          <a:cs typeface="Times New Roman" panose="02020603050405020304" pitchFamily="18" charset="0"/>
+                        </a:rPr>
+                        <a:t>National Renewable Energy Lab</a:t>
+                      </a:r>
                     </a:p>
                   </a:txBody>
                   <a:tcPr marL="86320" marR="86320" marT="0" marB="0"/>
@@ -33211,12 +33916,15 @@
                           <a:spcPts val="0"/>
                         </a:spcAft>
                       </a:pPr>
-                      <a:endParaRPr lang="en-US" sz="1400" dirty="0">
-                        <a:effectLst/>
-                        <a:latin typeface="Calibri" panose="020F0502020204030204" pitchFamily="34" charset="0"/>
-                        <a:ea typeface="Calibri" panose="020F0502020204030204" pitchFamily="34" charset="0"/>
-                        <a:cs typeface="Times New Roman" panose="02020603050405020304" pitchFamily="18" charset="0"/>
-                      </a:endParaRPr>
+                      <a:r>
+                        <a:rPr lang="en-US" sz="1400" dirty="0">
+                          <a:effectLst/>
+                          <a:latin typeface="Calibri" panose="020F0502020204030204" pitchFamily="34" charset="0"/>
+                          <a:ea typeface="Calibri" panose="020F0502020204030204" pitchFamily="34" charset="0"/>
+                          <a:cs typeface="Times New Roman" panose="02020603050405020304" pitchFamily="18" charset="0"/>
+                        </a:rPr>
+                        <a:t>SAME</a:t>
+                      </a:r>
                     </a:p>
                   </a:txBody>
                   <a:tcPr marL="86320" marR="86320" marT="0" marB="0"/>
@@ -33233,7 +33941,7 @@
                     <a:bodyPr/>
                     <a:lstStyle/>
                     <a:p>
-                      <a:pPr marL="0" marR="0" lvl="0" indent="0" algn="l" defTabSz="914400" rtl="0" eaLnBrk="1" fontAlgn="auto" latinLnBrk="0" hangingPunct="1">
+                      <a:pPr marL="0" marR="0" lvl="0" indent="0" algn="ctr" defTabSz="914400" rtl="0" eaLnBrk="1" fontAlgn="auto" latinLnBrk="0" hangingPunct="1">
                         <a:lnSpc>
                           <a:spcPct val="100000"/>
                         </a:lnSpc>
@@ -33311,7 +34019,7 @@
                   </a:ext>
                 </a:extLst>
               </a:tr>
-              <a:tr h="188040">
+              <a:tr h="318940">
                 <a:tc>
                   <a:txBody>
                     <a:bodyPr/>
@@ -33357,12 +34065,15 @@
                           <a:spcPts val="0"/>
                         </a:spcAft>
                       </a:pPr>
-                      <a:endParaRPr lang="en-US" sz="1400" dirty="0">
-                        <a:effectLst/>
-                        <a:latin typeface="Calibri" panose="020F0502020204030204" pitchFamily="34" charset="0"/>
-                        <a:ea typeface="Calibri" panose="020F0502020204030204" pitchFamily="34" charset="0"/>
-                        <a:cs typeface="Times New Roman" panose="02020603050405020304" pitchFamily="18" charset="0"/>
-                      </a:endParaRPr>
+                      <a:r>
+                        <a:rPr lang="en-US" sz="1400" dirty="0">
+                          <a:effectLst/>
+                          <a:latin typeface="Calibri" panose="020F0502020204030204" pitchFamily="34" charset="0"/>
+                          <a:ea typeface="Calibri" panose="020F0502020204030204" pitchFamily="34" charset="0"/>
+                          <a:cs typeface="Times New Roman" panose="02020603050405020304" pitchFamily="18" charset="0"/>
+                        </a:rPr>
+                        <a:t>US Census Bureau</a:t>
+                      </a:r>
                     </a:p>
                   </a:txBody>
                   <a:tcPr marL="86320" marR="86320" marT="0" marB="0"/>
@@ -33372,7 +34083,7 @@
                     <a:bodyPr/>
                     <a:lstStyle/>
                     <a:p>
-                      <a:pPr marL="0" marR="0">
+                      <a:pPr marL="0" marR="0" lvl="0" indent="0" algn="l" defTabSz="914400" rtl="0" eaLnBrk="1" fontAlgn="auto" latinLnBrk="0" hangingPunct="1">
                         <a:lnSpc>
                           <a:spcPct val="107000"/>
                         </a:lnSpc>
@@ -33382,13 +34093,22 @@
                         <a:spcAft>
                           <a:spcPts val="0"/>
                         </a:spcAft>
+                        <a:buClrTx/>
+                        <a:buSzTx/>
+                        <a:buFontTx/>
+                        <a:buNone/>
+                        <a:tabLst/>
+                        <a:defRPr/>
                       </a:pPr>
-                      <a:endParaRPr lang="en-US" sz="1400" dirty="0">
-                        <a:effectLst/>
-                        <a:latin typeface="Calibri" panose="020F0502020204030204" pitchFamily="34" charset="0"/>
-                        <a:ea typeface="Calibri" panose="020F0502020204030204" pitchFamily="34" charset="0"/>
-                        <a:cs typeface="Times New Roman" panose="02020603050405020304" pitchFamily="18" charset="0"/>
-                      </a:endParaRPr>
+                      <a:r>
+                        <a:rPr lang="en-US" sz="1400" dirty="0">
+                          <a:effectLst/>
+                          <a:latin typeface="Calibri" panose="020F0502020204030204" pitchFamily="34" charset="0"/>
+                          <a:ea typeface="Calibri" panose="020F0502020204030204" pitchFamily="34" charset="0"/>
+                          <a:cs typeface="Times New Roman" panose="02020603050405020304" pitchFamily="18" charset="0"/>
+                        </a:rPr>
+                        <a:t>County Health Ranking</a:t>
+                      </a:r>
                     </a:p>
                   </a:txBody>
                   <a:tcPr marL="86320" marR="86320" marT="0" marB="0"/>
@@ -33399,7 +34119,7 @@
                   </a:ext>
                 </a:extLst>
               </a:tr>
-              <a:tr h="461409">
+              <a:tr h="293298">
                 <a:tc>
                   <a:txBody>
                     <a:bodyPr/>
@@ -33445,12 +34165,15 @@
                           <a:spcPts val="0"/>
                         </a:spcAft>
                       </a:pPr>
-                      <a:endParaRPr lang="en-US" sz="1400" dirty="0">
-                        <a:effectLst/>
-                        <a:latin typeface="Calibri" panose="020F0502020204030204" pitchFamily="34" charset="0"/>
-                        <a:ea typeface="Calibri" panose="020F0502020204030204" pitchFamily="34" charset="0"/>
-                        <a:cs typeface="Times New Roman" panose="02020603050405020304" pitchFamily="18" charset="0"/>
-                      </a:endParaRPr>
+                      <a:r>
+                        <a:rPr lang="en-US" sz="1400" dirty="0">
+                          <a:effectLst/>
+                          <a:latin typeface="Calibri" panose="020F0502020204030204" pitchFamily="34" charset="0"/>
+                          <a:ea typeface="Calibri" panose="020F0502020204030204" pitchFamily="34" charset="0"/>
+                          <a:cs typeface="Times New Roman" panose="02020603050405020304" pitchFamily="18" charset="0"/>
+                        </a:rPr>
+                        <a:t>US Census Bureau</a:t>
+                      </a:r>
                     </a:p>
                   </a:txBody>
                   <a:tcPr marL="86320" marR="86320" marT="0" marB="0"/>
@@ -33460,7 +34183,7 @@
                     <a:bodyPr/>
                     <a:lstStyle/>
                     <a:p>
-                      <a:pPr marL="0" marR="0">
+                      <a:pPr marL="0" marR="0" lvl="0" indent="0" algn="l" defTabSz="914400" rtl="0" eaLnBrk="1" fontAlgn="auto" latinLnBrk="0" hangingPunct="1">
                         <a:lnSpc>
                           <a:spcPct val="107000"/>
                         </a:lnSpc>
@@ -33470,13 +34193,22 @@
                         <a:spcAft>
                           <a:spcPts val="0"/>
                         </a:spcAft>
+                        <a:buClrTx/>
+                        <a:buSzTx/>
+                        <a:buFontTx/>
+                        <a:buNone/>
+                        <a:tabLst/>
+                        <a:defRPr/>
                       </a:pPr>
-                      <a:endParaRPr lang="en-US" sz="1400" dirty="0">
-                        <a:effectLst/>
-                        <a:latin typeface="Calibri" panose="020F0502020204030204" pitchFamily="34" charset="0"/>
-                        <a:ea typeface="Calibri" panose="020F0502020204030204" pitchFamily="34" charset="0"/>
-                        <a:cs typeface="Times New Roman" panose="02020603050405020304" pitchFamily="18" charset="0"/>
-                      </a:endParaRPr>
+                      <a:r>
+                        <a:rPr lang="en-US" sz="1400" dirty="0">
+                          <a:effectLst/>
+                          <a:latin typeface="Calibri" panose="020F0502020204030204" pitchFamily="34" charset="0"/>
+                          <a:ea typeface="Calibri" panose="020F0502020204030204" pitchFamily="34" charset="0"/>
+                          <a:cs typeface="Times New Roman" panose="02020603050405020304" pitchFamily="18" charset="0"/>
+                        </a:rPr>
+                        <a:t>County Health Ranking</a:t>
+                      </a:r>
                     </a:p>
                   </a:txBody>
                   <a:tcPr marL="86320" marR="86320" marT="0" marB="0"/>
@@ -33487,7 +34219,7 @@
                   </a:ext>
                 </a:extLst>
               </a:tr>
-              <a:tr h="188040">
+              <a:tr h="332164">
                 <a:tc>
                   <a:txBody>
                     <a:bodyPr/>
@@ -33533,6 +34265,15 @@
                           <a:spcPts val="0"/>
                         </a:spcAft>
                       </a:pPr>
+                      <a:r>
+                        <a:rPr lang="en-US" sz="1400">
+                          <a:effectLst/>
+                          <a:latin typeface="Calibri" panose="020F0502020204030204" pitchFamily="34" charset="0"/>
+                          <a:ea typeface="Calibri" panose="020F0502020204030204" pitchFamily="34" charset="0"/>
+                          <a:cs typeface="Times New Roman" panose="02020603050405020304" pitchFamily="18" charset="0"/>
+                        </a:rPr>
+                        <a:t>County Health Ranking</a:t>
+                      </a:r>
                       <a:endParaRPr lang="en-US" sz="1400" dirty="0">
                         <a:effectLst/>
                         <a:latin typeface="Calibri" panose="020F0502020204030204" pitchFamily="34" charset="0"/>
@@ -33559,12 +34300,15 @@
                           <a:spcPts val="0"/>
                         </a:spcAft>
                       </a:pPr>
-                      <a:endParaRPr lang="en-US" sz="1400" dirty="0">
-                        <a:effectLst/>
-                        <a:latin typeface="Calibri" panose="020F0502020204030204" pitchFamily="34" charset="0"/>
-                        <a:ea typeface="Calibri" panose="020F0502020204030204" pitchFamily="34" charset="0"/>
-                        <a:cs typeface="Times New Roman" panose="02020603050405020304" pitchFamily="18" charset="0"/>
-                      </a:endParaRPr>
+                      <a:r>
+                        <a:rPr lang="en-US" sz="1400" dirty="0">
+                          <a:effectLst/>
+                          <a:latin typeface="Calibri" panose="020F0502020204030204" pitchFamily="34" charset="0"/>
+                          <a:ea typeface="Calibri" panose="020F0502020204030204" pitchFamily="34" charset="0"/>
+                          <a:cs typeface="Times New Roman" panose="02020603050405020304" pitchFamily="18" charset="0"/>
+                        </a:rPr>
+                        <a:t>SAME</a:t>
+                      </a:r>
                     </a:p>
                   </a:txBody>
                   <a:tcPr marL="86320" marR="86320" marT="0" marB="0"/>
@@ -33621,12 +34365,15 @@
                           <a:spcPts val="0"/>
                         </a:spcAft>
                       </a:pPr>
-                      <a:endParaRPr lang="en-US" sz="1400" dirty="0">
-                        <a:effectLst/>
-                        <a:latin typeface="Calibri" panose="020F0502020204030204" pitchFamily="34" charset="0"/>
-                        <a:ea typeface="Calibri" panose="020F0502020204030204" pitchFamily="34" charset="0"/>
-                        <a:cs typeface="Times New Roman" panose="02020603050405020304" pitchFamily="18" charset="0"/>
-                      </a:endParaRPr>
+                      <a:r>
+                        <a:rPr lang="en-US" sz="1400" dirty="0">
+                          <a:effectLst/>
+                          <a:latin typeface="Calibri" panose="020F0502020204030204" pitchFamily="34" charset="0"/>
+                          <a:ea typeface="Calibri" panose="020F0502020204030204" pitchFamily="34" charset="0"/>
+                          <a:cs typeface="Times New Roman" panose="02020603050405020304" pitchFamily="18" charset="0"/>
+                        </a:rPr>
+                        <a:t>US Census Bureau</a:t>
+                      </a:r>
                     </a:p>
                   </a:txBody>
                   <a:tcPr marL="86320" marR="86320" marT="0" marB="0"/>
@@ -33647,12 +34394,15 @@
                           <a:spcPts val="0"/>
                         </a:spcAft>
                       </a:pPr>
-                      <a:endParaRPr lang="en-US" sz="1400" dirty="0">
-                        <a:effectLst/>
-                        <a:latin typeface="Calibri" panose="020F0502020204030204" pitchFamily="34" charset="0"/>
-                        <a:ea typeface="Calibri" panose="020F0502020204030204" pitchFamily="34" charset="0"/>
-                        <a:cs typeface="Times New Roman" panose="02020603050405020304" pitchFamily="18" charset="0"/>
-                      </a:endParaRPr>
+                      <a:r>
+                        <a:rPr lang="en-US" sz="1400" dirty="0">
+                          <a:effectLst/>
+                          <a:latin typeface="Calibri" panose="020F0502020204030204" pitchFamily="34" charset="0"/>
+                          <a:ea typeface="Calibri" panose="020F0502020204030204" pitchFamily="34" charset="0"/>
+                          <a:cs typeface="Times New Roman" panose="02020603050405020304" pitchFamily="18" charset="0"/>
+                        </a:rPr>
+                        <a:t>County Health Ranking</a:t>
+                      </a:r>
                     </a:p>
                   </a:txBody>
                   <a:tcPr marL="86320" marR="86320" marT="0" marB="0"/>
@@ -33669,7 +34419,7 @@
                     <a:bodyPr/>
                     <a:lstStyle/>
                     <a:p>
-                      <a:pPr marL="0" marR="0" lvl="0" indent="0" algn="l" defTabSz="914400" rtl="0" eaLnBrk="1" fontAlgn="auto" latinLnBrk="0" hangingPunct="1">
+                      <a:pPr marL="0" marR="0" lvl="0" indent="0" algn="ctr" defTabSz="914400" rtl="0" eaLnBrk="1" fontAlgn="auto" latinLnBrk="0" hangingPunct="1">
                         <a:lnSpc>
                           <a:spcPct val="100000"/>
                         </a:lnSpc>
@@ -33793,12 +34543,15 @@
                           <a:spcPts val="0"/>
                         </a:spcAft>
                       </a:pPr>
-                      <a:endParaRPr lang="en-US" sz="1400" dirty="0">
-                        <a:effectLst/>
-                        <a:latin typeface="Calibri" panose="020F0502020204030204" pitchFamily="34" charset="0"/>
-                        <a:ea typeface="Calibri" panose="020F0502020204030204" pitchFamily="34" charset="0"/>
-                        <a:cs typeface="Times New Roman" panose="02020603050405020304" pitchFamily="18" charset="0"/>
-                      </a:endParaRPr>
+                      <a:r>
+                        <a:rPr lang="en-US" sz="1400" dirty="0">
+                          <a:effectLst/>
+                          <a:latin typeface="Calibri" panose="020F0502020204030204" pitchFamily="34" charset="0"/>
+                          <a:ea typeface="Calibri" panose="020F0502020204030204" pitchFamily="34" charset="0"/>
+                          <a:cs typeface="Times New Roman" panose="02020603050405020304" pitchFamily="18" charset="0"/>
+                        </a:rPr>
+                        <a:t>Bureau Labor Statistics</a:t>
+                      </a:r>
                     </a:p>
                   </a:txBody>
                   <a:tcPr marL="86320" marR="86320" marT="0" marB="0"/>
@@ -33819,12 +34572,15 @@
                           <a:spcPts val="0"/>
                         </a:spcAft>
                       </a:pPr>
-                      <a:endParaRPr lang="en-US" sz="1400" dirty="0">
-                        <a:effectLst/>
-                        <a:latin typeface="Calibri" panose="020F0502020204030204" pitchFamily="34" charset="0"/>
-                        <a:ea typeface="Calibri" panose="020F0502020204030204" pitchFamily="34" charset="0"/>
-                        <a:cs typeface="Times New Roman" panose="02020603050405020304" pitchFamily="18" charset="0"/>
-                      </a:endParaRPr>
+                      <a:r>
+                        <a:rPr lang="en-US" sz="1400" dirty="0">
+                          <a:effectLst/>
+                          <a:latin typeface="Calibri" panose="020F0502020204030204" pitchFamily="34" charset="0"/>
+                          <a:ea typeface="Calibri" panose="020F0502020204030204" pitchFamily="34" charset="0"/>
+                          <a:cs typeface="Times New Roman" panose="02020603050405020304" pitchFamily="18" charset="0"/>
+                        </a:rPr>
+                        <a:t>County Health Ranking</a:t>
+                      </a:r>
                     </a:p>
                   </a:txBody>
                   <a:tcPr marL="86320" marR="86320" marT="0" marB="0"/>
@@ -33881,12 +34637,15 @@
                           <a:spcPts val="0"/>
                         </a:spcAft>
                       </a:pPr>
-                      <a:endParaRPr lang="en-US" sz="1400" dirty="0">
-                        <a:effectLst/>
-                        <a:latin typeface="Calibri" panose="020F0502020204030204" pitchFamily="34" charset="0"/>
-                        <a:ea typeface="Calibri" panose="020F0502020204030204" pitchFamily="34" charset="0"/>
-                        <a:cs typeface="Times New Roman" panose="02020603050405020304" pitchFamily="18" charset="0"/>
-                      </a:endParaRPr>
+                      <a:r>
+                        <a:rPr lang="en-US" sz="1400" dirty="0">
+                          <a:effectLst/>
+                          <a:latin typeface="Calibri" panose="020F0502020204030204" pitchFamily="34" charset="0"/>
+                          <a:ea typeface="Calibri" panose="020F0502020204030204" pitchFamily="34" charset="0"/>
+                          <a:cs typeface="Times New Roman" panose="02020603050405020304" pitchFamily="18" charset="0"/>
+                        </a:rPr>
+                        <a:t>USDA</a:t>
+                      </a:r>
                     </a:p>
                   </a:txBody>
                   <a:tcPr marL="86320" marR="86320" marT="0" marB="0"/>
@@ -33896,7 +34655,7 @@
                     <a:bodyPr/>
                     <a:lstStyle/>
                     <a:p>
-                      <a:pPr marL="0" marR="0">
+                      <a:pPr marL="0" marR="0" lvl="0" indent="0" algn="l" defTabSz="914400" rtl="0" eaLnBrk="1" fontAlgn="auto" latinLnBrk="0" hangingPunct="1">
                         <a:lnSpc>
                           <a:spcPct val="107000"/>
                         </a:lnSpc>
@@ -33906,13 +34665,22 @@
                         <a:spcAft>
                           <a:spcPts val="0"/>
                         </a:spcAft>
+                        <a:buClrTx/>
+                        <a:buSzTx/>
+                        <a:buFontTx/>
+                        <a:buNone/>
+                        <a:tabLst/>
+                        <a:defRPr/>
                       </a:pPr>
-                      <a:endParaRPr lang="en-US" sz="1400" dirty="0">
-                        <a:effectLst/>
-                        <a:latin typeface="Calibri" panose="020F0502020204030204" pitchFamily="34" charset="0"/>
-                        <a:ea typeface="Calibri" panose="020F0502020204030204" pitchFamily="34" charset="0"/>
-                        <a:cs typeface="Times New Roman" panose="02020603050405020304" pitchFamily="18" charset="0"/>
-                      </a:endParaRPr>
+                      <a:r>
+                        <a:rPr lang="en-US" sz="1400" dirty="0">
+                          <a:effectLst/>
+                          <a:latin typeface="Calibri" panose="020F0502020204030204" pitchFamily="34" charset="0"/>
+                          <a:ea typeface="Calibri" panose="020F0502020204030204" pitchFamily="34" charset="0"/>
+                          <a:cs typeface="Times New Roman" panose="02020603050405020304" pitchFamily="18" charset="0"/>
+                        </a:rPr>
+                        <a:t>US Census, SAIPE</a:t>
+                      </a:r>
                     </a:p>
                   </a:txBody>
                   <a:tcPr marL="86320" marR="86320" marT="0" marB="0"/>
@@ -33958,7 +34726,7 @@
                     <a:bodyPr/>
                     <a:lstStyle/>
                     <a:p>
-                      <a:pPr marL="0" marR="0">
+                      <a:pPr marL="0" marR="0" lvl="0" indent="0" algn="l" defTabSz="914400" rtl="0" eaLnBrk="1" fontAlgn="auto" latinLnBrk="0" hangingPunct="1">
                         <a:lnSpc>
                           <a:spcPct val="107000"/>
                         </a:lnSpc>
@@ -33968,13 +34736,22 @@
                         <a:spcAft>
                           <a:spcPts val="0"/>
                         </a:spcAft>
+                        <a:buClrTx/>
+                        <a:buSzTx/>
+                        <a:buFontTx/>
+                        <a:buNone/>
+                        <a:tabLst/>
+                        <a:defRPr/>
                       </a:pPr>
-                      <a:endParaRPr lang="en-US" sz="1400" dirty="0">
-                        <a:effectLst/>
-                        <a:latin typeface="Calibri" panose="020F0502020204030204" pitchFamily="34" charset="0"/>
-                        <a:ea typeface="Calibri" panose="020F0502020204030204" pitchFamily="34" charset="0"/>
-                        <a:cs typeface="Times New Roman" panose="02020603050405020304" pitchFamily="18" charset="0"/>
-                      </a:endParaRPr>
+                      <a:r>
+                        <a:rPr lang="en-US" sz="1400" dirty="0">
+                          <a:effectLst/>
+                          <a:latin typeface="Calibri" panose="020F0502020204030204" pitchFamily="34" charset="0"/>
+                          <a:ea typeface="Calibri" panose="020F0502020204030204" pitchFamily="34" charset="0"/>
+                          <a:cs typeface="Times New Roman" panose="02020603050405020304" pitchFamily="18" charset="0"/>
+                        </a:rPr>
+                        <a:t>US Census, SAIPE</a:t>
+                      </a:r>
                     </a:p>
                   </a:txBody>
                   <a:tcPr marL="86320" marR="86320" marT="0" marB="0"/>
@@ -33984,7 +34761,7 @@
                     <a:bodyPr/>
                     <a:lstStyle/>
                     <a:p>
-                      <a:pPr marL="0" marR="0">
+                      <a:pPr marL="0" marR="0" lvl="0" indent="0" algn="l" defTabSz="914400" rtl="0" eaLnBrk="1" fontAlgn="auto" latinLnBrk="0" hangingPunct="1">
                         <a:lnSpc>
                           <a:spcPct val="107000"/>
                         </a:lnSpc>
@@ -33994,13 +34771,22 @@
                         <a:spcAft>
                           <a:spcPts val="0"/>
                         </a:spcAft>
+                        <a:buClrTx/>
+                        <a:buSzTx/>
+                        <a:buFontTx/>
+                        <a:buNone/>
+                        <a:tabLst/>
+                        <a:defRPr/>
                       </a:pPr>
-                      <a:endParaRPr lang="en-US" sz="1400" dirty="0">
-                        <a:effectLst/>
-                        <a:latin typeface="Calibri" panose="020F0502020204030204" pitchFamily="34" charset="0"/>
-                        <a:ea typeface="Calibri" panose="020F0502020204030204" pitchFamily="34" charset="0"/>
-                        <a:cs typeface="Times New Roman" panose="02020603050405020304" pitchFamily="18" charset="0"/>
-                      </a:endParaRPr>
+                      <a:r>
+                        <a:rPr lang="en-US" sz="1400" dirty="0">
+                          <a:effectLst/>
+                          <a:latin typeface="Calibri" panose="020F0502020204030204" pitchFamily="34" charset="0"/>
+                          <a:ea typeface="Calibri" panose="020F0502020204030204" pitchFamily="34" charset="0"/>
+                          <a:cs typeface="Times New Roman" panose="02020603050405020304" pitchFamily="18" charset="0"/>
+                        </a:rPr>
+                        <a:t>County Health Ranking</a:t>
+                      </a:r>
                     </a:p>
                   </a:txBody>
                   <a:tcPr marL="86320" marR="86320" marT="0" marB="0"/>
@@ -34046,7 +34832,7 @@
                     <a:bodyPr/>
                     <a:lstStyle/>
                     <a:p>
-                      <a:pPr marL="0" marR="0">
+                      <a:pPr marL="0" marR="0" lvl="0" indent="0" algn="l" defTabSz="914400" rtl="0" eaLnBrk="1" fontAlgn="auto" latinLnBrk="0" hangingPunct="1">
                         <a:lnSpc>
                           <a:spcPct val="107000"/>
                         </a:lnSpc>
@@ -34056,13 +34842,22 @@
                         <a:spcAft>
                           <a:spcPts val="0"/>
                         </a:spcAft>
+                        <a:buClrTx/>
+                        <a:buSzTx/>
+                        <a:buFontTx/>
+                        <a:buNone/>
+                        <a:tabLst/>
+                        <a:defRPr/>
                       </a:pPr>
-                      <a:endParaRPr lang="en-US" sz="1400" dirty="0">
-                        <a:effectLst/>
-                        <a:latin typeface="Calibri" panose="020F0502020204030204" pitchFamily="34" charset="0"/>
-                        <a:ea typeface="Calibri" panose="020F0502020204030204" pitchFamily="34" charset="0"/>
-                        <a:cs typeface="Times New Roman" panose="02020603050405020304" pitchFamily="18" charset="0"/>
-                      </a:endParaRPr>
+                      <a:r>
+                        <a:rPr lang="en-US" sz="1400" dirty="0">
+                          <a:effectLst/>
+                          <a:latin typeface="Calibri" panose="020F0502020204030204" pitchFamily="34" charset="0"/>
+                          <a:ea typeface="Calibri" panose="020F0502020204030204" pitchFamily="34" charset="0"/>
+                          <a:cs typeface="Times New Roman" panose="02020603050405020304" pitchFamily="18" charset="0"/>
+                        </a:rPr>
+                        <a:t>US Census Bureau</a:t>
+                      </a:r>
                     </a:p>
                   </a:txBody>
                   <a:tcPr marL="86320" marR="86320" marT="0" marB="0"/>
@@ -34072,7 +34867,7 @@
                     <a:bodyPr/>
                     <a:lstStyle/>
                     <a:p>
-                      <a:pPr marL="0" marR="0">
+                      <a:pPr marL="0" marR="0" lvl="0" indent="0" algn="l" defTabSz="914400" rtl="0" eaLnBrk="1" fontAlgn="auto" latinLnBrk="0" hangingPunct="1">
                         <a:lnSpc>
                           <a:spcPct val="107000"/>
                         </a:lnSpc>
@@ -34082,13 +34877,22 @@
                         <a:spcAft>
                           <a:spcPts val="0"/>
                         </a:spcAft>
+                        <a:buClrTx/>
+                        <a:buSzTx/>
+                        <a:buFontTx/>
+                        <a:buNone/>
+                        <a:tabLst/>
+                        <a:defRPr/>
                       </a:pPr>
-                      <a:endParaRPr lang="en-US" sz="1400" dirty="0">
-                        <a:effectLst/>
-                        <a:latin typeface="Calibri" panose="020F0502020204030204" pitchFamily="34" charset="0"/>
-                        <a:ea typeface="Calibri" panose="020F0502020204030204" pitchFamily="34" charset="0"/>
-                        <a:cs typeface="Times New Roman" panose="02020603050405020304" pitchFamily="18" charset="0"/>
-                      </a:endParaRPr>
+                      <a:r>
+                        <a:rPr lang="en-US" sz="1400" dirty="0">
+                          <a:effectLst/>
+                          <a:latin typeface="Calibri" panose="020F0502020204030204" pitchFamily="34" charset="0"/>
+                          <a:ea typeface="Calibri" panose="020F0502020204030204" pitchFamily="34" charset="0"/>
+                          <a:cs typeface="Times New Roman" panose="02020603050405020304" pitchFamily="18" charset="0"/>
+                        </a:rPr>
+                        <a:t>County Health Ranking</a:t>
+                      </a:r>
                     </a:p>
                   </a:txBody>
                   <a:tcPr marL="86320" marR="86320" marT="0" marB="0"/>
@@ -34105,7 +34909,7 @@
                     <a:bodyPr/>
                     <a:lstStyle/>
                     <a:p>
-                      <a:pPr marL="0" marR="0" lvl="0" indent="0" algn="l" defTabSz="914400" rtl="0" eaLnBrk="1" fontAlgn="auto" latinLnBrk="0" hangingPunct="1">
+                      <a:pPr marL="0" marR="0" lvl="0" indent="0" algn="ctr" defTabSz="914400" rtl="0" eaLnBrk="1" fontAlgn="auto" latinLnBrk="0" hangingPunct="1">
                         <a:lnSpc>
                           <a:spcPct val="100000"/>
                         </a:lnSpc>
@@ -34229,12 +35033,15 @@
                           <a:spcPts val="0"/>
                         </a:spcAft>
                       </a:pPr>
-                      <a:endParaRPr lang="en-US" sz="1400" dirty="0">
-                        <a:effectLst/>
-                        <a:latin typeface="Calibri" panose="020F0502020204030204" pitchFamily="34" charset="0"/>
-                        <a:ea typeface="Calibri" panose="020F0502020204030204" pitchFamily="34" charset="0"/>
-                        <a:cs typeface="Times New Roman" panose="02020603050405020304" pitchFamily="18" charset="0"/>
-                      </a:endParaRPr>
+                      <a:r>
+                        <a:rPr lang="en-US" sz="1400" dirty="0">
+                          <a:effectLst/>
+                          <a:latin typeface="Calibri" panose="020F0502020204030204" pitchFamily="34" charset="0"/>
+                          <a:ea typeface="Calibri" panose="020F0502020204030204" pitchFamily="34" charset="0"/>
+                          <a:cs typeface="Times New Roman" panose="02020603050405020304" pitchFamily="18" charset="0"/>
+                        </a:rPr>
+                        <a:t>USDA</a:t>
+                      </a:r>
                     </a:p>
                   </a:txBody>
                   <a:tcPr marL="86320" marR="86320" marT="0" marB="0"/>
@@ -34244,7 +35051,7 @@
                     <a:bodyPr/>
                     <a:lstStyle/>
                     <a:p>
-                      <a:pPr marL="0" marR="0">
+                      <a:pPr marL="0" marR="0" lvl="0" indent="0" algn="l" defTabSz="914400" rtl="0" eaLnBrk="1" fontAlgn="auto" latinLnBrk="0" hangingPunct="1">
                         <a:lnSpc>
                           <a:spcPct val="107000"/>
                         </a:lnSpc>
@@ -34254,13 +35061,22 @@
                         <a:spcAft>
                           <a:spcPts val="0"/>
                         </a:spcAft>
+                        <a:buClrTx/>
+                        <a:buSzTx/>
+                        <a:buFontTx/>
+                        <a:buNone/>
+                        <a:tabLst/>
+                        <a:defRPr/>
                       </a:pPr>
-                      <a:endParaRPr lang="en-US" sz="1400" dirty="0">
-                        <a:effectLst/>
-                        <a:latin typeface="Calibri" panose="020F0502020204030204" pitchFamily="34" charset="0"/>
-                        <a:ea typeface="Calibri" panose="020F0502020204030204" pitchFamily="34" charset="0"/>
-                        <a:cs typeface="Times New Roman" panose="02020603050405020304" pitchFamily="18" charset="0"/>
-                      </a:endParaRPr>
+                      <a:r>
+                        <a:rPr lang="en-US" sz="1400" dirty="0">
+                          <a:effectLst/>
+                          <a:latin typeface="Calibri" panose="020F0502020204030204" pitchFamily="34" charset="0"/>
+                          <a:ea typeface="Calibri" panose="020F0502020204030204" pitchFamily="34" charset="0"/>
+                          <a:cs typeface="Times New Roman" panose="02020603050405020304" pitchFamily="18" charset="0"/>
+                        </a:rPr>
+                        <a:t>County Health Ranking</a:t>
+                      </a:r>
                     </a:p>
                   </a:txBody>
                   <a:tcPr marL="86320" marR="86320" marT="0" marB="0"/>
@@ -34317,12 +35133,15 @@
                           <a:spcPts val="0"/>
                         </a:spcAft>
                       </a:pPr>
-                      <a:endParaRPr lang="en-US" sz="1400" dirty="0">
-                        <a:effectLst/>
-                        <a:latin typeface="Calibri" panose="020F0502020204030204" pitchFamily="34" charset="0"/>
-                        <a:ea typeface="Calibri" panose="020F0502020204030204" pitchFamily="34" charset="0"/>
-                        <a:cs typeface="Times New Roman" panose="02020603050405020304" pitchFamily="18" charset="0"/>
-                      </a:endParaRPr>
+                      <a:r>
+                        <a:rPr lang="en-US" sz="1400" dirty="0">
+                          <a:effectLst/>
+                          <a:latin typeface="Calibri" panose="020F0502020204030204" pitchFamily="34" charset="0"/>
+                          <a:ea typeface="Calibri" panose="020F0502020204030204" pitchFamily="34" charset="0"/>
+                          <a:cs typeface="Times New Roman" panose="02020603050405020304" pitchFamily="18" charset="0"/>
+                        </a:rPr>
+                        <a:t>USDA</a:t>
+                      </a:r>
                     </a:p>
                   </a:txBody>
                   <a:tcPr marL="86320" marR="86320" marT="0" marB="0"/>
@@ -34331,6 +35150,34 @@
                   <a:txBody>
                     <a:bodyPr/>
                     <a:lstStyle/>
+                    <a:p>
+                      <a:pPr marL="0" marR="0" lvl="0" indent="0" algn="l" defTabSz="914400" rtl="0" eaLnBrk="1" fontAlgn="auto" latinLnBrk="0" hangingPunct="1">
+                        <a:lnSpc>
+                          <a:spcPct val="107000"/>
+                        </a:lnSpc>
+                        <a:spcBef>
+                          <a:spcPts val="0"/>
+                        </a:spcBef>
+                        <a:spcAft>
+                          <a:spcPts val="0"/>
+                        </a:spcAft>
+                        <a:buClrTx/>
+                        <a:buSzTx/>
+                        <a:buFontTx/>
+                        <a:buNone/>
+                        <a:tabLst/>
+                        <a:defRPr/>
+                      </a:pPr>
+                      <a:r>
+                        <a:rPr lang="en-US" sz="1400" dirty="0">
+                          <a:effectLst/>
+                          <a:latin typeface="Calibri" panose="020F0502020204030204" pitchFamily="34" charset="0"/>
+                          <a:ea typeface="Calibri" panose="020F0502020204030204" pitchFamily="34" charset="0"/>
+                          <a:cs typeface="Times New Roman" panose="02020603050405020304" pitchFamily="18" charset="0"/>
+                        </a:rPr>
+                        <a:t>County Health Ranking</a:t>
+                      </a:r>
+                    </a:p>
                     <a:p>
                       <a:pPr marL="0" marR="0">
                         <a:lnSpc>
@@ -34383,7 +35230,7 @@
                           <a:ea typeface="Calibri" panose="020F0502020204030204" pitchFamily="34" charset="0"/>
                           <a:cs typeface="Times New Roman" panose="02020603050405020304" pitchFamily="18" charset="0"/>
                         </a:rPr>
-                        <a:t>% pop Food Insecure</a:t>
+                        <a:t>% pop Food Insecure/Rank</a:t>
                       </a:r>
                     </a:p>
                   </a:txBody>
@@ -34405,12 +35252,15 @@
                           <a:spcPts val="0"/>
                         </a:spcAft>
                       </a:pPr>
-                      <a:endParaRPr lang="en-US" sz="1400" dirty="0">
-                        <a:effectLst/>
-                        <a:latin typeface="Calibri" panose="020F0502020204030204" pitchFamily="34" charset="0"/>
-                        <a:ea typeface="Calibri" panose="020F0502020204030204" pitchFamily="34" charset="0"/>
-                        <a:cs typeface="Times New Roman" panose="02020603050405020304" pitchFamily="18" charset="0"/>
-                      </a:endParaRPr>
+                      <a:r>
+                        <a:rPr lang="en-US" sz="1400" dirty="0">
+                          <a:effectLst/>
+                          <a:latin typeface="Calibri" panose="020F0502020204030204" pitchFamily="34" charset="0"/>
+                          <a:ea typeface="Calibri" panose="020F0502020204030204" pitchFamily="34" charset="0"/>
+                          <a:cs typeface="Times New Roman" panose="02020603050405020304" pitchFamily="18" charset="0"/>
+                        </a:rPr>
+                        <a:t>County Health Ranking (%)</a:t>
+                      </a:r>
                     </a:p>
                   </a:txBody>
                   <a:tcPr marL="86320" marR="86320" marT="0" marB="0"/>
@@ -34420,7 +35270,7 @@
                     <a:bodyPr/>
                     <a:lstStyle/>
                     <a:p>
-                      <a:pPr marL="0" marR="0">
+                      <a:pPr marL="0" marR="0" lvl="0" indent="0" algn="l" defTabSz="914400" rtl="0" eaLnBrk="1" fontAlgn="auto" latinLnBrk="0" hangingPunct="1">
                         <a:lnSpc>
                           <a:spcPct val="107000"/>
                         </a:lnSpc>
@@ -34430,13 +35280,22 @@
                         <a:spcAft>
                           <a:spcPts val="0"/>
                         </a:spcAft>
+                        <a:buClrTx/>
+                        <a:buSzTx/>
+                        <a:buFontTx/>
+                        <a:buNone/>
+                        <a:tabLst/>
+                        <a:defRPr/>
                       </a:pPr>
-                      <a:endParaRPr lang="en-US" sz="1400" dirty="0">
-                        <a:effectLst/>
-                        <a:latin typeface="Calibri" panose="020F0502020204030204" pitchFamily="34" charset="0"/>
-                        <a:ea typeface="Calibri" panose="020F0502020204030204" pitchFamily="34" charset="0"/>
-                        <a:cs typeface="Times New Roman" panose="02020603050405020304" pitchFamily="18" charset="0"/>
-                      </a:endParaRPr>
+                      <a:r>
+                        <a:rPr lang="en-US" sz="1400" dirty="0">
+                          <a:effectLst/>
+                          <a:latin typeface="Calibri" panose="020F0502020204030204" pitchFamily="34" charset="0"/>
+                          <a:ea typeface="Calibri" panose="020F0502020204030204" pitchFamily="34" charset="0"/>
+                          <a:cs typeface="Times New Roman" panose="02020603050405020304" pitchFamily="18" charset="0"/>
+                        </a:rPr>
+                        <a:t>County Health Ranking (rank)</a:t>
+                      </a:r>
                     </a:p>
                   </a:txBody>
                   <a:tcPr marL="86320" marR="86320" marT="0" marB="0"/>
@@ -34493,12 +35352,15 @@
                           <a:spcPts val="0"/>
                         </a:spcAft>
                       </a:pPr>
-                      <a:endParaRPr lang="en-US" sz="1400" dirty="0">
-                        <a:effectLst/>
-                        <a:latin typeface="Calibri" panose="020F0502020204030204" pitchFamily="34" charset="0"/>
-                        <a:ea typeface="Calibri" panose="020F0502020204030204" pitchFamily="34" charset="0"/>
-                        <a:cs typeface="Times New Roman" panose="02020603050405020304" pitchFamily="18" charset="0"/>
-                      </a:endParaRPr>
+                      <a:r>
+                        <a:rPr lang="en-US" sz="1400" dirty="0">
+                          <a:effectLst/>
+                          <a:latin typeface="Calibri" panose="020F0502020204030204" pitchFamily="34" charset="0"/>
+                          <a:ea typeface="Calibri" panose="020F0502020204030204" pitchFamily="34" charset="0"/>
+                          <a:cs typeface="Times New Roman" panose="02020603050405020304" pitchFamily="18" charset="0"/>
+                        </a:rPr>
+                        <a:t>County Health</a:t>
+                      </a:r>
                     </a:p>
                   </a:txBody>
                   <a:tcPr marL="86320" marR="86320" marT="0" marB="0"/>
@@ -34508,7 +35370,7 @@
                     <a:bodyPr/>
                     <a:lstStyle/>
                     <a:p>
-                      <a:pPr marL="0" marR="0">
+                      <a:pPr marL="0" marR="0" lvl="0" indent="0" algn="l" defTabSz="914400" rtl="0" eaLnBrk="1" fontAlgn="auto" latinLnBrk="0" hangingPunct="1">
                         <a:lnSpc>
                           <a:spcPct val="107000"/>
                         </a:lnSpc>
@@ -34518,13 +35380,22 @@
                         <a:spcAft>
                           <a:spcPts val="0"/>
                         </a:spcAft>
+                        <a:buClrTx/>
+                        <a:buSzTx/>
+                        <a:buFontTx/>
+                        <a:buNone/>
+                        <a:tabLst/>
+                        <a:defRPr/>
                       </a:pPr>
-                      <a:endParaRPr lang="en-US" sz="1400" dirty="0">
-                        <a:effectLst/>
-                        <a:latin typeface="Calibri" panose="020F0502020204030204" pitchFamily="34" charset="0"/>
-                        <a:ea typeface="Calibri" panose="020F0502020204030204" pitchFamily="34" charset="0"/>
-                        <a:cs typeface="Times New Roman" panose="02020603050405020304" pitchFamily="18" charset="0"/>
-                      </a:endParaRPr>
+                      <a:r>
+                        <a:rPr lang="en-US" sz="1400" dirty="0">
+                          <a:effectLst/>
+                          <a:latin typeface="Calibri" panose="020F0502020204030204" pitchFamily="34" charset="0"/>
+                          <a:ea typeface="Calibri" panose="020F0502020204030204" pitchFamily="34" charset="0"/>
+                          <a:cs typeface="Times New Roman" panose="02020603050405020304" pitchFamily="18" charset="0"/>
+                        </a:rPr>
+                        <a:t>SAME</a:t>
+                      </a:r>
                     </a:p>
                   </a:txBody>
                   <a:tcPr marL="86320" marR="86320" marT="0" marB="0"/>

</xml_diff>